<commit_message>
Included SBGN PNG images in presentation
Exported PNG versions of the SBGN diagrams for the powerpoint
presentation
</commit_message>
<xml_diff>
--- a/translation_finalPres.pptx
+++ b/translation_finalPres.pptx
@@ -9,12 +9,13 @@
     <p:sldId id="262" r:id="rId3"/>
     <p:sldId id="265" r:id="rId4"/>
     <p:sldId id="264" r:id="rId5"/>
-    <p:sldId id="263" r:id="rId6"/>
-    <p:sldId id="257" r:id="rId7"/>
-    <p:sldId id="258" r:id="rId8"/>
-    <p:sldId id="260" r:id="rId9"/>
-    <p:sldId id="261" r:id="rId10"/>
-    <p:sldId id="259" r:id="rId11"/>
+    <p:sldId id="266" r:id="rId6"/>
+    <p:sldId id="263" r:id="rId7"/>
+    <p:sldId id="257" r:id="rId8"/>
+    <p:sldId id="258" r:id="rId9"/>
+    <p:sldId id="260" r:id="rId10"/>
+    <p:sldId id="261" r:id="rId11"/>
+    <p:sldId id="259" r:id="rId12"/>
   </p:sldIdLst>
   <p:sldSz cx="9144000" cy="6858000" type="screen4x3"/>
   <p:notesSz cx="6858000" cy="9144000"/>
@@ -3275,6 +3276,145 @@
           <a:p>
             <a:r>
               <a:rPr lang="en-AU" dirty="0" smtClean="0"/>
+              <a:t>Things to fix/change - Translation</a:t>
+            </a:r>
+            <a:endParaRPr lang="en-AU" dirty="0"/>
+          </a:p>
+        </p:txBody>
+      </p:sp>
+      <p:sp>
+        <p:nvSpPr>
+          <p:cNvPr id="3" name="Content Placeholder 2"/>
+          <p:cNvSpPr>
+            <a:spLocks noGrp="1"/>
+          </p:cNvSpPr>
+          <p:nvPr>
+            <p:ph idx="1"/>
+          </p:nvPr>
+        </p:nvSpPr>
+        <p:spPr>
+          <a:xfrm>
+            <a:off x="457200" y="1600200"/>
+            <a:ext cx="8229600" cy="4925144"/>
+          </a:xfrm>
+        </p:spPr>
+        <p:txBody>
+          <a:bodyPr>
+            <a:normAutofit fontScale="92500" lnSpcReduction="10000"/>
+          </a:bodyPr>
+          <a:lstStyle/>
+          <a:p>
+            <a:r>
+              <a:rPr lang="en-AU" dirty="0" smtClean="0"/>
+              <a:t>Limit maximum extension within a single model iteration</a:t>
+            </a:r>
+          </a:p>
+          <a:p>
+            <a:pPr lvl="1"/>
+            <a:r>
+              <a:rPr lang="en-AU" dirty="0" smtClean="0"/>
+              <a:t>Unlikely, but possible with Gillespie algorithm that a single amino acid + ribosome extends more than possible</a:t>
+            </a:r>
+          </a:p>
+          <a:p>
+            <a:endParaRPr lang="en-AU" dirty="0"/>
+          </a:p>
+          <a:p>
+            <a:r>
+              <a:rPr lang="en-AU" dirty="0" smtClean="0"/>
+              <a:t>Define module requirements for integration</a:t>
+            </a:r>
+          </a:p>
+          <a:p>
+            <a:pPr lvl="1"/>
+            <a:r>
+              <a:rPr lang="en-AU" dirty="0" smtClean="0"/>
+              <a:t>Jonathan’s talk:</a:t>
+            </a:r>
+          </a:p>
+          <a:p>
+            <a:pPr lvl="2"/>
+            <a:r>
+              <a:rPr lang="en-AU" dirty="0" smtClean="0"/>
+              <a:t>Translation: 29% of ATP</a:t>
+            </a:r>
+          </a:p>
+          <a:p>
+            <a:pPr lvl="2"/>
+            <a:r>
+              <a:rPr lang="en-AU" dirty="0" err="1" smtClean="0"/>
+              <a:t>tRNA</a:t>
+            </a:r>
+            <a:r>
+              <a:rPr lang="en-AU" dirty="0" smtClean="0"/>
+              <a:t> </a:t>
+            </a:r>
+            <a:r>
+              <a:rPr lang="en-AU" dirty="0" err="1" smtClean="0"/>
+              <a:t>aminoacylation</a:t>
+            </a:r>
+            <a:r>
+              <a:rPr lang="en-AU" dirty="0" smtClean="0"/>
+              <a:t>: 15.1% of ATP</a:t>
+            </a:r>
+          </a:p>
+          <a:p>
+            <a:pPr lvl="2"/>
+            <a:r>
+              <a:rPr lang="en-AU" dirty="0" smtClean="0"/>
+              <a:t>Unknown: ~40%(?) of ATP</a:t>
+            </a:r>
+            <a:endParaRPr lang="en-AU" dirty="0"/>
+          </a:p>
+        </p:txBody>
+      </p:sp>
+    </p:spTree>
+    <p:extLst>
+      <p:ext uri="{BB962C8B-B14F-4D97-AF65-F5344CB8AC3E}">
+        <p14:creationId xmlns:p14="http://schemas.microsoft.com/office/powerpoint/2010/main" val="1456272442"/>
+      </p:ext>
+    </p:extLst>
+  </p:cSld>
+  <p:clrMapOvr>
+    <a:masterClrMapping/>
+  </p:clrMapOvr>
+</p:sld>
+</file>
+
+<file path=ppt/slides/slide11.xml><?xml version="1.0" encoding="utf-8"?>
+<p:sld xmlns:a="http://schemas.openxmlformats.org/drawingml/2006/main" xmlns:r="http://schemas.openxmlformats.org/officeDocument/2006/relationships" xmlns:p="http://schemas.openxmlformats.org/presentationml/2006/main">
+  <p:cSld>
+    <p:spTree>
+      <p:nvGrpSpPr>
+        <p:cNvPr id="1" name=""/>
+        <p:cNvGrpSpPr/>
+        <p:nvPr/>
+      </p:nvGrpSpPr>
+      <p:grpSpPr>
+        <a:xfrm>
+          <a:off x="0" y="0"/>
+          <a:ext cx="0" cy="0"/>
+          <a:chOff x="0" y="0"/>
+          <a:chExt cx="0" cy="0"/>
+        </a:xfrm>
+      </p:grpSpPr>
+      <p:sp>
+        <p:nvSpPr>
+          <p:cNvPr id="2" name="Title 1"/>
+          <p:cNvSpPr>
+            <a:spLocks noGrp="1"/>
+          </p:cNvSpPr>
+          <p:nvPr>
+            <p:ph type="title"/>
+          </p:nvPr>
+        </p:nvSpPr>
+        <p:spPr/>
+        <p:txBody>
+          <a:bodyPr/>
+          <a:lstStyle/>
+          <a:p>
+            <a:r>
+              <a:rPr lang="en-AU" dirty="0" smtClean="0"/>
               <a:t>Things to fix/change</a:t>
             </a:r>
             <a:endParaRPr lang="en-AU" dirty="0"/>
@@ -3491,18 +3631,55 @@
           <a:p>
             <a:r>
               <a:rPr lang="en-AU" dirty="0" smtClean="0"/>
-              <a:t>As specified by Jonathan (30 odd reactions)</a:t>
-            </a:r>
-          </a:p>
-          <a:p>
-            <a:r>
-              <a:rPr lang="en-AU" dirty="0" smtClean="0"/>
-              <a:t>[insert SBGN diagram]</a:t>
-            </a:r>
-            <a:endParaRPr lang="en-AU" dirty="0"/>
-          </a:p>
-        </p:txBody>
-      </p:sp>
+              <a:t>As specified by Jonathan (30 odd reactions</a:t>
+            </a:r>
+            <a:r>
+              <a:rPr lang="en-AU" dirty="0" smtClean="0"/>
+              <a:t>)</a:t>
+            </a:r>
+            <a:endParaRPr lang="en-AU" dirty="0" smtClean="0"/>
+          </a:p>
+        </p:txBody>
+      </p:sp>
+      <p:pic>
+        <p:nvPicPr>
+          <p:cNvPr id="1026" name="Picture 2" descr="C:\wc\2014_VW_modelling_workshop\wholecell-translation\sbgn\aminoacylation.graphml.png"/>
+          <p:cNvPicPr>
+            <a:picLocks noChangeAspect="1" noChangeArrowheads="1"/>
+          </p:cNvPicPr>
+          <p:nvPr/>
+        </p:nvPicPr>
+        <p:blipFill rotWithShape="1">
+          <a:blip r:embed="rId2" cstate="print">
+            <a:extLst>
+              <a:ext uri="{28A0092B-C50C-407E-A947-70E740481C1C}">
+                <a14:useLocalDpi xmlns:a14="http://schemas.microsoft.com/office/drawing/2010/main" val="0"/>
+              </a:ext>
+            </a:extLst>
+          </a:blip>
+          <a:srcRect r="27334"/>
+          <a:stretch/>
+        </p:blipFill>
+        <p:spPr bwMode="auto">
+          <a:xfrm>
+            <a:off x="1979712" y="2276872"/>
+            <a:ext cx="4896544" cy="4402233"/>
+          </a:xfrm>
+          <a:prstGeom prst="rect">
+            <a:avLst/>
+          </a:prstGeom>
+          <a:noFill/>
+          <a:extLst>
+            <a:ext uri="{909E8E84-426E-40DD-AFC4-6F175D3DCCD1}">
+              <a14:hiddenFill xmlns:a14="http://schemas.microsoft.com/office/drawing/2010/main">
+                <a:solidFill>
+                  <a:srgbClr val="FFFFFF"/>
+                </a:solidFill>
+              </a14:hiddenFill>
+            </a:ext>
+          </a:extLst>
+        </p:spPr>
+      </p:pic>
     </p:spTree>
     <p:extLst>
       <p:ext uri="{BB962C8B-B14F-4D97-AF65-F5344CB8AC3E}">
@@ -3747,15 +3924,13 @@
             </a:r>
             <a:r>
               <a:rPr lang="en-AU" dirty="0" smtClean="0"/>
-              <a:t> script using protein sequences</a:t>
-            </a:r>
-          </a:p>
-          <a:p>
-            <a:r>
-              <a:rPr lang="en-AU" dirty="0" smtClean="0"/>
-              <a:t>[insert SBGN diagram]</a:t>
-            </a:r>
-            <a:endParaRPr lang="en-AU" dirty="0"/>
+              <a:t> script using protein </a:t>
+            </a:r>
+            <a:r>
+              <a:rPr lang="en-AU" dirty="0" smtClean="0"/>
+              <a:t>sequences</a:t>
+            </a:r>
+            <a:endParaRPr lang="en-AU" dirty="0" smtClean="0"/>
           </a:p>
         </p:txBody>
       </p:sp>
@@ -3801,12 +3976,14 @@
         </p:nvSpPr>
         <p:spPr/>
         <p:txBody>
-          <a:bodyPr/>
-          <a:lstStyle/>
-          <a:p>
-            <a:r>
-              <a:rPr lang="en-AU" dirty="0" smtClean="0"/>
-              <a:t>Current Implementation</a:t>
+          <a:bodyPr>
+            <a:normAutofit fontScale="90000"/>
+          </a:bodyPr>
+          <a:lstStyle/>
+          <a:p>
+            <a:r>
+              <a:rPr lang="en-AU" dirty="0" smtClean="0"/>
+              <a:t>Current implementation – Translation</a:t>
             </a:r>
             <a:endParaRPr lang="en-AU" dirty="0"/>
           </a:p>
@@ -3827,32 +4004,55 @@
           <a:bodyPr/>
           <a:lstStyle/>
           <a:p>
-            <a:r>
-              <a:rPr lang="en-AU" dirty="0" smtClean="0"/>
-              <a:t>Avoid stochastic process by applying Gillespie algorithm</a:t>
-            </a:r>
-          </a:p>
-          <a:p>
-            <a:pPr lvl="1"/>
-            <a:r>
-              <a:rPr lang="en-AU" dirty="0" smtClean="0"/>
-              <a:t>Handles relative likelihoods of alternative reactions, weighted by concentrations</a:t>
-            </a:r>
-          </a:p>
-          <a:p>
-            <a:pPr lvl="1"/>
-            <a:r>
-              <a:rPr lang="en-AU" dirty="0" smtClean="0"/>
-              <a:t>More natural SBML representation, but very large SBML files (long time to parse; much greater memory requirements; greatly reduced run times in the absence of ‘sparse matrix’ representation)</a:t>
-            </a:r>
-            <a:endParaRPr lang="en-AU" dirty="0"/>
-          </a:p>
-        </p:txBody>
-      </p:sp>
+            <a:endParaRPr lang="en-AU" dirty="0" smtClean="0"/>
+          </a:p>
+        </p:txBody>
+      </p:sp>
+      <p:pic>
+        <p:nvPicPr>
+          <p:cNvPr id="2050" name="Picture 2" descr="C:\wc\2014_VW_modelling_workshop\wholecell-translation\sbgn\translation_withOmittedProcess_3.graphml.png"/>
+          <p:cNvPicPr>
+            <a:picLocks noChangeAspect="1" noChangeArrowheads="1"/>
+          </p:cNvPicPr>
+          <p:nvPr/>
+        </p:nvPicPr>
+        <p:blipFill>
+          <a:blip r:embed="rId2" cstate="print">
+            <a:extLst>
+              <a:ext uri="{28A0092B-C50C-407E-A947-70E740481C1C}">
+                <a14:useLocalDpi xmlns:a14="http://schemas.microsoft.com/office/drawing/2010/main" val="0"/>
+              </a:ext>
+            </a:extLst>
+          </a:blip>
+          <a:srcRect/>
+          <a:stretch>
+            <a:fillRect/>
+          </a:stretch>
+        </p:blipFill>
+        <p:spPr bwMode="auto">
+          <a:xfrm>
+            <a:off x="539552" y="1628800"/>
+            <a:ext cx="8119799" cy="3816424"/>
+          </a:xfrm>
+          <a:prstGeom prst="rect">
+            <a:avLst/>
+          </a:prstGeom>
+          <a:noFill/>
+          <a:extLst>
+            <a:ext uri="{909E8E84-426E-40DD-AFC4-6F175D3DCCD1}">
+              <a14:hiddenFill xmlns:a14="http://schemas.microsoft.com/office/drawing/2010/main">
+                <a:solidFill>
+                  <a:srgbClr val="FFFFFF"/>
+                </a:solidFill>
+              </a14:hiddenFill>
+            </a:ext>
+          </a:extLst>
+        </p:spPr>
+      </p:pic>
     </p:spTree>
     <p:extLst>
       <p:ext uri="{BB962C8B-B14F-4D97-AF65-F5344CB8AC3E}">
-        <p14:creationId xmlns:p14="http://schemas.microsoft.com/office/powerpoint/2010/main" val="2148760098"/>
+        <p14:creationId xmlns:p14="http://schemas.microsoft.com/office/powerpoint/2010/main" val="2597699786"/>
       </p:ext>
     </p:extLst>
   </p:cSld>
@@ -3891,18 +4091,12 @@
         </p:nvSpPr>
         <p:spPr/>
         <p:txBody>
-          <a:bodyPr>
-            <a:normAutofit fontScale="90000"/>
-          </a:bodyPr>
-          <a:lstStyle/>
-          <a:p>
-            <a:r>
-              <a:rPr lang="en-AU" dirty="0" smtClean="0"/>
-              <a:t>Things to fix/change - </a:t>
-            </a:r>
-            <a:r>
-              <a:rPr lang="en-AU" dirty="0" err="1" smtClean="0"/>
-              <a:t>AminoAcylation</a:t>
+          <a:bodyPr/>
+          <a:lstStyle/>
+          <a:p>
+            <a:r>
+              <a:rPr lang="en-AU" dirty="0" smtClean="0"/>
+              <a:t>Current Implementation</a:t>
             </a:r>
             <a:endParaRPr lang="en-AU" dirty="0"/>
           </a:p>
@@ -3920,238 +4114,35 @@
         </p:nvSpPr>
         <p:spPr/>
         <p:txBody>
-          <a:bodyPr>
-            <a:normAutofit/>
-          </a:bodyPr>
-          <a:lstStyle/>
-          <a:p>
-            <a:r>
-              <a:rPr lang="en-AU" dirty="0" err="1" smtClean="0"/>
-              <a:t>tRNA</a:t>
-            </a:r>
-            <a:r>
-              <a:rPr lang="en-AU" dirty="0" smtClean="0"/>
-              <a:t> </a:t>
-            </a:r>
-            <a:r>
-              <a:rPr lang="en-AU" dirty="0" err="1" smtClean="0"/>
-              <a:t>aminoacylation</a:t>
-            </a:r>
-            <a:r>
-              <a:rPr lang="en-AU" dirty="0" smtClean="0"/>
-              <a:t> performed as a single step catalysed by </a:t>
-            </a:r>
-            <a:r>
-              <a:rPr lang="en-AU" dirty="0" err="1" smtClean="0"/>
-              <a:t>AAx-tRNA</a:t>
-            </a:r>
-            <a:r>
-              <a:rPr lang="en-AU" dirty="0" smtClean="0"/>
-              <a:t> ligase</a:t>
+          <a:bodyPr/>
+          <a:lstStyle/>
+          <a:p>
+            <a:r>
+              <a:rPr lang="en-AU" dirty="0" smtClean="0"/>
+              <a:t>Avoid stochastic process by applying Gillespie algorithm</a:t>
             </a:r>
           </a:p>
           <a:p>
             <a:pPr lvl="1"/>
             <a:r>
               <a:rPr lang="en-AU" dirty="0" smtClean="0"/>
-              <a:t>Introduce intermediate steps</a:t>
-            </a:r>
-          </a:p>
-          <a:p>
-            <a:pPr marL="57150" indent="0">
-              <a:buNone/>
-            </a:pPr>
+              <a:t>Handles relative likelihoods of alternative reactions, weighted by concentrations</a:t>
+            </a:r>
+          </a:p>
+          <a:p>
+            <a:pPr lvl="1"/>
+            <a:r>
+              <a:rPr lang="en-AU" dirty="0" smtClean="0"/>
+              <a:t>More natural SBML representation, but very large SBML files (long time to parse; much greater memory requirements; greatly reduced run times in the absence of ‘sparse matrix’ representation)</a:t>
+            </a:r>
             <a:endParaRPr lang="en-AU" dirty="0"/>
-          </a:p>
-          <a:p>
-            <a:pPr marL="57150" indent="0">
-              <a:buNone/>
-            </a:pPr>
-            <a:r>
-              <a:rPr lang="en-AU" sz="2800" dirty="0" err="1" smtClean="0"/>
-              <a:t>AAx</a:t>
-            </a:r>
-            <a:r>
-              <a:rPr lang="en-AU" sz="2800" dirty="0" smtClean="0"/>
-              <a:t> + </a:t>
-            </a:r>
-            <a:r>
-              <a:rPr lang="en-AU" sz="2800" dirty="0" err="1" smtClean="0"/>
-              <a:t>tRNA</a:t>
-            </a:r>
-            <a:r>
-              <a:rPr lang="en-AU" sz="2800" dirty="0" smtClean="0"/>
-              <a:t>(</a:t>
-            </a:r>
-            <a:r>
-              <a:rPr lang="en-AU" sz="2800" dirty="0" err="1" smtClean="0"/>
-              <a:t>AAx</a:t>
-            </a:r>
-            <a:r>
-              <a:rPr lang="en-AU" sz="2800" dirty="0" smtClean="0"/>
-              <a:t>) + ATP </a:t>
-            </a:r>
-            <a:r>
-              <a:rPr lang="en-AU" sz="2800" dirty="0" smtClean="0">
-                <a:sym typeface="Wingdings" panose="05000000000000000000" pitchFamily="2" charset="2"/>
-              </a:rPr>
-              <a:t> </a:t>
-            </a:r>
-            <a:r>
-              <a:rPr lang="en-AU" sz="2800" dirty="0" err="1" smtClean="0">
-                <a:sym typeface="Wingdings" panose="05000000000000000000" pitchFamily="2" charset="2"/>
-              </a:rPr>
-              <a:t>AAx-tRNA</a:t>
-            </a:r>
-            <a:r>
-              <a:rPr lang="en-AU" sz="2800" dirty="0" smtClean="0">
-                <a:sym typeface="Wingdings" panose="05000000000000000000" pitchFamily="2" charset="2"/>
-              </a:rPr>
-              <a:t>(</a:t>
-            </a:r>
-            <a:r>
-              <a:rPr lang="en-AU" sz="2800" dirty="0" err="1" smtClean="0">
-                <a:sym typeface="Wingdings" panose="05000000000000000000" pitchFamily="2" charset="2"/>
-              </a:rPr>
-              <a:t>AAx</a:t>
-            </a:r>
-            <a:r>
-              <a:rPr lang="en-AU" sz="2800" dirty="0" smtClean="0">
-                <a:sym typeface="Wingdings" panose="05000000000000000000" pitchFamily="2" charset="2"/>
-              </a:rPr>
-              <a:t>) + </a:t>
-            </a:r>
-            <a:r>
-              <a:rPr lang="en-AU" sz="2800" dirty="0" err="1" smtClean="0">
-                <a:sym typeface="Wingdings" panose="05000000000000000000" pitchFamily="2" charset="2"/>
-              </a:rPr>
-              <a:t>PPi</a:t>
-            </a:r>
-            <a:r>
-              <a:rPr lang="en-AU" sz="2800" dirty="0" smtClean="0">
-                <a:sym typeface="Wingdings" panose="05000000000000000000" pitchFamily="2" charset="2"/>
-              </a:rPr>
-              <a:t>  + AMP</a:t>
-            </a:r>
-          </a:p>
-          <a:p>
-            <a:pPr marL="57150" indent="0">
-              <a:buNone/>
-            </a:pPr>
-            <a:endParaRPr lang="en-AU" sz="2800" dirty="0">
-              <a:sym typeface="Wingdings" panose="05000000000000000000" pitchFamily="2" charset="2"/>
-            </a:endParaRPr>
-          </a:p>
-          <a:p>
-            <a:pPr marL="57150" indent="0">
-              <a:buNone/>
-            </a:pPr>
-            <a:r>
-              <a:rPr lang="en-AU" sz="2800" dirty="0" err="1" smtClean="0">
-                <a:sym typeface="Wingdings" panose="05000000000000000000" pitchFamily="2" charset="2"/>
-              </a:rPr>
-              <a:t>AAx</a:t>
-            </a:r>
-            <a:r>
-              <a:rPr lang="en-AU" sz="2800" dirty="0" smtClean="0">
-                <a:sym typeface="Wingdings" panose="05000000000000000000" pitchFamily="2" charset="2"/>
-              </a:rPr>
-              <a:t> + ATP  </a:t>
-            </a:r>
-            <a:r>
-              <a:rPr lang="en-AU" sz="2800" dirty="0" err="1" smtClean="0">
-                <a:sym typeface="Wingdings" panose="05000000000000000000" pitchFamily="2" charset="2"/>
-              </a:rPr>
-              <a:t>AAx</a:t>
-            </a:r>
-            <a:r>
-              <a:rPr lang="en-AU" sz="2800" dirty="0" smtClean="0">
-                <a:sym typeface="Wingdings" panose="05000000000000000000" pitchFamily="2" charset="2"/>
-              </a:rPr>
-              <a:t>-AMP + </a:t>
-            </a:r>
-            <a:r>
-              <a:rPr lang="en-AU" sz="2800" dirty="0" err="1" smtClean="0">
-                <a:sym typeface="Wingdings" panose="05000000000000000000" pitchFamily="2" charset="2"/>
-              </a:rPr>
-              <a:t>PPi</a:t>
-            </a:r>
-            <a:endParaRPr lang="en-AU" sz="2800" dirty="0" smtClean="0">
-              <a:sym typeface="Wingdings" panose="05000000000000000000" pitchFamily="2" charset="2"/>
-            </a:endParaRPr>
-          </a:p>
-          <a:p>
-            <a:pPr marL="57150" indent="0">
-              <a:buNone/>
-            </a:pPr>
-            <a:r>
-              <a:rPr lang="en-AU" sz="2800" dirty="0" err="1" smtClean="0">
-                <a:sym typeface="Wingdings" panose="05000000000000000000" pitchFamily="2" charset="2"/>
-              </a:rPr>
-              <a:t>AAx</a:t>
-            </a:r>
-            <a:r>
-              <a:rPr lang="en-AU" sz="2800" dirty="0" smtClean="0">
-                <a:sym typeface="Wingdings" panose="05000000000000000000" pitchFamily="2" charset="2"/>
-              </a:rPr>
-              <a:t>-AMP + </a:t>
-            </a:r>
-            <a:r>
-              <a:rPr lang="en-AU" sz="2800" dirty="0" err="1" smtClean="0">
-                <a:sym typeface="Wingdings" panose="05000000000000000000" pitchFamily="2" charset="2"/>
-              </a:rPr>
-              <a:t>tRNA</a:t>
-            </a:r>
-            <a:r>
-              <a:rPr lang="en-AU" sz="2800" dirty="0" smtClean="0">
-                <a:sym typeface="Wingdings" panose="05000000000000000000" pitchFamily="2" charset="2"/>
-              </a:rPr>
-              <a:t>(</a:t>
-            </a:r>
-            <a:r>
-              <a:rPr lang="en-AU" sz="2800" dirty="0" err="1" smtClean="0">
-                <a:sym typeface="Wingdings" panose="05000000000000000000" pitchFamily="2" charset="2"/>
-              </a:rPr>
-              <a:t>AAx</a:t>
-            </a:r>
-            <a:r>
-              <a:rPr lang="en-AU" sz="2800" dirty="0" smtClean="0">
-                <a:sym typeface="Wingdings" panose="05000000000000000000" pitchFamily="2" charset="2"/>
-              </a:rPr>
-              <a:t>)  AMP + </a:t>
-            </a:r>
-            <a:r>
-              <a:rPr lang="en-AU" sz="2800" dirty="0" err="1" smtClean="0">
-                <a:sym typeface="Wingdings" panose="05000000000000000000" pitchFamily="2" charset="2"/>
-              </a:rPr>
-              <a:t>AAx-tRNA</a:t>
-            </a:r>
-            <a:r>
-              <a:rPr lang="en-AU" sz="2800" dirty="0" smtClean="0">
-                <a:sym typeface="Wingdings" panose="05000000000000000000" pitchFamily="2" charset="2"/>
-              </a:rPr>
-              <a:t>(</a:t>
-            </a:r>
-            <a:r>
-              <a:rPr lang="en-AU" sz="2800" dirty="0" err="1" smtClean="0">
-                <a:sym typeface="Wingdings" panose="05000000000000000000" pitchFamily="2" charset="2"/>
-              </a:rPr>
-              <a:t>AAx</a:t>
-            </a:r>
-            <a:r>
-              <a:rPr lang="en-AU" sz="2800" dirty="0" smtClean="0">
-                <a:sym typeface="Wingdings" panose="05000000000000000000" pitchFamily="2" charset="2"/>
-              </a:rPr>
-              <a:t>)</a:t>
-            </a:r>
-            <a:endParaRPr lang="en-AU" sz="2800" dirty="0"/>
           </a:p>
         </p:txBody>
       </p:sp>
     </p:spTree>
     <p:extLst>
       <p:ext uri="{BB962C8B-B14F-4D97-AF65-F5344CB8AC3E}">
-        <p14:creationId xmlns:p14="http://schemas.microsoft.com/office/powerpoint/2010/main" val="368424594"/>
+        <p14:creationId xmlns:p14="http://schemas.microsoft.com/office/powerpoint/2010/main" val="2148760098"/>
       </p:ext>
     </p:extLst>
   </p:cSld>
@@ -4190,6 +4181,305 @@
         </p:nvSpPr>
         <p:spPr/>
         <p:txBody>
+          <a:bodyPr>
+            <a:normAutofit fontScale="90000"/>
+          </a:bodyPr>
+          <a:lstStyle/>
+          <a:p>
+            <a:r>
+              <a:rPr lang="en-AU" dirty="0" smtClean="0"/>
+              <a:t>Things to fix/change - </a:t>
+            </a:r>
+            <a:r>
+              <a:rPr lang="en-AU" dirty="0" err="1" smtClean="0"/>
+              <a:t>AminoAcylation</a:t>
+            </a:r>
+            <a:endParaRPr lang="en-AU" dirty="0"/>
+          </a:p>
+        </p:txBody>
+      </p:sp>
+      <p:sp>
+        <p:nvSpPr>
+          <p:cNvPr id="3" name="Content Placeholder 2"/>
+          <p:cNvSpPr>
+            <a:spLocks noGrp="1"/>
+          </p:cNvSpPr>
+          <p:nvPr>
+            <p:ph idx="1"/>
+          </p:nvPr>
+        </p:nvSpPr>
+        <p:spPr/>
+        <p:txBody>
+          <a:bodyPr>
+            <a:normAutofit/>
+          </a:bodyPr>
+          <a:lstStyle/>
+          <a:p>
+            <a:r>
+              <a:rPr lang="en-AU" dirty="0" err="1" smtClean="0"/>
+              <a:t>tRNA</a:t>
+            </a:r>
+            <a:r>
+              <a:rPr lang="en-AU" dirty="0" smtClean="0"/>
+              <a:t> </a:t>
+            </a:r>
+            <a:r>
+              <a:rPr lang="en-AU" dirty="0" err="1" smtClean="0"/>
+              <a:t>aminoacylation</a:t>
+            </a:r>
+            <a:r>
+              <a:rPr lang="en-AU" dirty="0" smtClean="0"/>
+              <a:t> performed as a single step catalysed by </a:t>
+            </a:r>
+            <a:r>
+              <a:rPr lang="en-AU" dirty="0" err="1" smtClean="0"/>
+              <a:t>AAx-tRNA</a:t>
+            </a:r>
+            <a:r>
+              <a:rPr lang="en-AU" dirty="0" smtClean="0"/>
+              <a:t> ligase</a:t>
+            </a:r>
+          </a:p>
+          <a:p>
+            <a:pPr lvl="1"/>
+            <a:r>
+              <a:rPr lang="en-AU" dirty="0" smtClean="0"/>
+              <a:t>Introduce intermediate steps</a:t>
+            </a:r>
+          </a:p>
+          <a:p>
+            <a:pPr marL="57150" indent="0">
+              <a:buNone/>
+            </a:pPr>
+            <a:endParaRPr lang="en-AU" dirty="0"/>
+          </a:p>
+          <a:p>
+            <a:pPr marL="57150" indent="0">
+              <a:buNone/>
+            </a:pPr>
+            <a:r>
+              <a:rPr lang="en-AU" sz="2800" dirty="0" err="1" smtClean="0"/>
+              <a:t>AAx</a:t>
+            </a:r>
+            <a:r>
+              <a:rPr lang="en-AU" sz="2800" dirty="0" smtClean="0"/>
+              <a:t> + </a:t>
+            </a:r>
+            <a:r>
+              <a:rPr lang="en-AU" sz="2800" dirty="0" err="1" smtClean="0"/>
+              <a:t>tRNA</a:t>
+            </a:r>
+            <a:r>
+              <a:rPr lang="en-AU" sz="2800" dirty="0" smtClean="0"/>
+              <a:t>(</a:t>
+            </a:r>
+            <a:r>
+              <a:rPr lang="en-AU" sz="2800" dirty="0" err="1" smtClean="0"/>
+              <a:t>AAx</a:t>
+            </a:r>
+            <a:r>
+              <a:rPr lang="en-AU" sz="2800" dirty="0" smtClean="0"/>
+              <a:t>) + ATP </a:t>
+            </a:r>
+            <a:r>
+              <a:rPr lang="en-AU" sz="2800" dirty="0" smtClean="0">
+                <a:sym typeface="Wingdings" panose="05000000000000000000" pitchFamily="2" charset="2"/>
+              </a:rPr>
+              <a:t> </a:t>
+            </a:r>
+            <a:r>
+              <a:rPr lang="en-AU" sz="2800" dirty="0" err="1" smtClean="0">
+                <a:sym typeface="Wingdings" panose="05000000000000000000" pitchFamily="2" charset="2"/>
+              </a:rPr>
+              <a:t>AAx-tRNA</a:t>
+            </a:r>
+            <a:r>
+              <a:rPr lang="en-AU" sz="2800" dirty="0" smtClean="0">
+                <a:sym typeface="Wingdings" panose="05000000000000000000" pitchFamily="2" charset="2"/>
+              </a:rPr>
+              <a:t>(</a:t>
+            </a:r>
+            <a:r>
+              <a:rPr lang="en-AU" sz="2800" dirty="0" err="1" smtClean="0">
+                <a:sym typeface="Wingdings" panose="05000000000000000000" pitchFamily="2" charset="2"/>
+              </a:rPr>
+              <a:t>AAx</a:t>
+            </a:r>
+            <a:r>
+              <a:rPr lang="en-AU" sz="2800" dirty="0" smtClean="0">
+                <a:sym typeface="Wingdings" panose="05000000000000000000" pitchFamily="2" charset="2"/>
+              </a:rPr>
+              <a:t>) + </a:t>
+            </a:r>
+            <a:r>
+              <a:rPr lang="en-AU" sz="2800" dirty="0" err="1" smtClean="0">
+                <a:sym typeface="Wingdings" panose="05000000000000000000" pitchFamily="2" charset="2"/>
+              </a:rPr>
+              <a:t>PPi</a:t>
+            </a:r>
+            <a:r>
+              <a:rPr lang="en-AU" sz="2800" dirty="0" smtClean="0">
+                <a:sym typeface="Wingdings" panose="05000000000000000000" pitchFamily="2" charset="2"/>
+              </a:rPr>
+              <a:t>  + AMP</a:t>
+            </a:r>
+          </a:p>
+          <a:p>
+            <a:pPr marL="57150" indent="0">
+              <a:buNone/>
+            </a:pPr>
+            <a:endParaRPr lang="en-AU" sz="2800" dirty="0">
+              <a:sym typeface="Wingdings" panose="05000000000000000000" pitchFamily="2" charset="2"/>
+            </a:endParaRPr>
+          </a:p>
+          <a:p>
+            <a:pPr marL="57150" indent="0">
+              <a:buNone/>
+            </a:pPr>
+            <a:r>
+              <a:rPr lang="en-AU" sz="2800" dirty="0" err="1" smtClean="0">
+                <a:sym typeface="Wingdings" panose="05000000000000000000" pitchFamily="2" charset="2"/>
+              </a:rPr>
+              <a:t>AAx</a:t>
+            </a:r>
+            <a:r>
+              <a:rPr lang="en-AU" sz="2800" dirty="0" smtClean="0">
+                <a:sym typeface="Wingdings" panose="05000000000000000000" pitchFamily="2" charset="2"/>
+              </a:rPr>
+              <a:t> + ATP  </a:t>
+            </a:r>
+            <a:r>
+              <a:rPr lang="en-AU" sz="2800" dirty="0" err="1" smtClean="0">
+                <a:sym typeface="Wingdings" panose="05000000000000000000" pitchFamily="2" charset="2"/>
+              </a:rPr>
+              <a:t>AAx</a:t>
+            </a:r>
+            <a:r>
+              <a:rPr lang="en-AU" sz="2800" dirty="0" smtClean="0">
+                <a:sym typeface="Wingdings" panose="05000000000000000000" pitchFamily="2" charset="2"/>
+              </a:rPr>
+              <a:t>-AMP + </a:t>
+            </a:r>
+            <a:r>
+              <a:rPr lang="en-AU" sz="2800" dirty="0" err="1" smtClean="0">
+                <a:sym typeface="Wingdings" panose="05000000000000000000" pitchFamily="2" charset="2"/>
+              </a:rPr>
+              <a:t>PPi</a:t>
+            </a:r>
+            <a:endParaRPr lang="en-AU" sz="2800" dirty="0" smtClean="0">
+              <a:sym typeface="Wingdings" panose="05000000000000000000" pitchFamily="2" charset="2"/>
+            </a:endParaRPr>
+          </a:p>
+          <a:p>
+            <a:pPr marL="57150" indent="0">
+              <a:buNone/>
+            </a:pPr>
+            <a:r>
+              <a:rPr lang="en-AU" sz="2800" dirty="0" err="1" smtClean="0">
+                <a:sym typeface="Wingdings" panose="05000000000000000000" pitchFamily="2" charset="2"/>
+              </a:rPr>
+              <a:t>AAx</a:t>
+            </a:r>
+            <a:r>
+              <a:rPr lang="en-AU" sz="2800" dirty="0" smtClean="0">
+                <a:sym typeface="Wingdings" panose="05000000000000000000" pitchFamily="2" charset="2"/>
+              </a:rPr>
+              <a:t>-AMP + </a:t>
+            </a:r>
+            <a:r>
+              <a:rPr lang="en-AU" sz="2800" dirty="0" err="1" smtClean="0">
+                <a:sym typeface="Wingdings" panose="05000000000000000000" pitchFamily="2" charset="2"/>
+              </a:rPr>
+              <a:t>tRNA</a:t>
+            </a:r>
+            <a:r>
+              <a:rPr lang="en-AU" sz="2800" dirty="0" smtClean="0">
+                <a:sym typeface="Wingdings" panose="05000000000000000000" pitchFamily="2" charset="2"/>
+              </a:rPr>
+              <a:t>(</a:t>
+            </a:r>
+            <a:r>
+              <a:rPr lang="en-AU" sz="2800" dirty="0" err="1" smtClean="0">
+                <a:sym typeface="Wingdings" panose="05000000000000000000" pitchFamily="2" charset="2"/>
+              </a:rPr>
+              <a:t>AAx</a:t>
+            </a:r>
+            <a:r>
+              <a:rPr lang="en-AU" sz="2800" dirty="0" smtClean="0">
+                <a:sym typeface="Wingdings" panose="05000000000000000000" pitchFamily="2" charset="2"/>
+              </a:rPr>
+              <a:t>)  AMP + </a:t>
+            </a:r>
+            <a:r>
+              <a:rPr lang="en-AU" sz="2800" dirty="0" err="1" smtClean="0">
+                <a:sym typeface="Wingdings" panose="05000000000000000000" pitchFamily="2" charset="2"/>
+              </a:rPr>
+              <a:t>AAx-tRNA</a:t>
+            </a:r>
+            <a:r>
+              <a:rPr lang="en-AU" sz="2800" dirty="0" smtClean="0">
+                <a:sym typeface="Wingdings" panose="05000000000000000000" pitchFamily="2" charset="2"/>
+              </a:rPr>
+              <a:t>(</a:t>
+            </a:r>
+            <a:r>
+              <a:rPr lang="en-AU" sz="2800" dirty="0" err="1" smtClean="0">
+                <a:sym typeface="Wingdings" panose="05000000000000000000" pitchFamily="2" charset="2"/>
+              </a:rPr>
+              <a:t>AAx</a:t>
+            </a:r>
+            <a:r>
+              <a:rPr lang="en-AU" sz="2800" dirty="0" smtClean="0">
+                <a:sym typeface="Wingdings" panose="05000000000000000000" pitchFamily="2" charset="2"/>
+              </a:rPr>
+              <a:t>)</a:t>
+            </a:r>
+            <a:endParaRPr lang="en-AU" sz="2800" dirty="0"/>
+          </a:p>
+        </p:txBody>
+      </p:sp>
+    </p:spTree>
+    <p:extLst>
+      <p:ext uri="{BB962C8B-B14F-4D97-AF65-F5344CB8AC3E}">
+        <p14:creationId xmlns:p14="http://schemas.microsoft.com/office/powerpoint/2010/main" val="368424594"/>
+      </p:ext>
+    </p:extLst>
+  </p:cSld>
+  <p:clrMapOvr>
+    <a:masterClrMapping/>
+  </p:clrMapOvr>
+</p:sld>
+</file>
+
+<file path=ppt/slides/slide8.xml><?xml version="1.0" encoding="utf-8"?>
+<p:sld xmlns:a="http://schemas.openxmlformats.org/drawingml/2006/main" xmlns:r="http://schemas.openxmlformats.org/officeDocument/2006/relationships" xmlns:p="http://schemas.openxmlformats.org/presentationml/2006/main">
+  <p:cSld>
+    <p:spTree>
+      <p:nvGrpSpPr>
+        <p:cNvPr id="1" name=""/>
+        <p:cNvGrpSpPr/>
+        <p:nvPr/>
+      </p:nvGrpSpPr>
+      <p:grpSpPr>
+        <a:xfrm>
+          <a:off x="0" y="0"/>
+          <a:ext cx="0" cy="0"/>
+          <a:chOff x="0" y="0"/>
+          <a:chExt cx="0" cy="0"/>
+        </a:xfrm>
+      </p:grpSpPr>
+      <p:sp>
+        <p:nvSpPr>
+          <p:cNvPr id="2" name="Title 1"/>
+          <p:cNvSpPr>
+            <a:spLocks noGrp="1"/>
+          </p:cNvSpPr>
+          <p:nvPr>
+            <p:ph type="title"/>
+          </p:nvPr>
+        </p:nvSpPr>
+        <p:spPr/>
+        <p:txBody>
           <a:bodyPr/>
           <a:lstStyle/>
           <a:p>
@@ -4201,8 +4491,8 @@
           </a:p>
         </p:txBody>
       </p:sp>
-      <mc:AlternateContent xmlns:mc="http://schemas.openxmlformats.org/markup-compatibility/2006">
-        <mc:Choice xmlns:a14="http://schemas.microsoft.com/office/drawing/2010/main" Requires="a14">
+      <mc:AlternateContent xmlns:mc="http://schemas.openxmlformats.org/markup-compatibility/2006" xmlns:a14="http://schemas.microsoft.com/office/drawing/2010/main">
+        <mc:Choice Requires="a14">
           <p:sp>
             <p:nvSpPr>
               <p:cNvPr id="3" name="Content Placeholder 2"/>
@@ -4336,7 +4626,7 @@
             </p:txBody>
           </p:sp>
         </mc:Choice>
-        <mc:Fallback>
+        <mc:Fallback xmlns="">
           <p:sp>
             <p:nvSpPr>
               <p:cNvPr id="3" name="Content Placeholder 2"/>
@@ -4383,138 +4673,6 @@
 </p:sld>
 </file>
 
-<file path=ppt/slides/slide8.xml><?xml version="1.0" encoding="utf-8"?>
-<p:sld xmlns:a="http://schemas.openxmlformats.org/drawingml/2006/main" xmlns:r="http://schemas.openxmlformats.org/officeDocument/2006/relationships" xmlns:p="http://schemas.openxmlformats.org/presentationml/2006/main">
-  <p:cSld>
-    <p:spTree>
-      <p:nvGrpSpPr>
-        <p:cNvPr id="1" name=""/>
-        <p:cNvGrpSpPr/>
-        <p:nvPr/>
-      </p:nvGrpSpPr>
-      <p:grpSpPr>
-        <a:xfrm>
-          <a:off x="0" y="0"/>
-          <a:ext cx="0" cy="0"/>
-          <a:chOff x="0" y="0"/>
-          <a:chExt cx="0" cy="0"/>
-        </a:xfrm>
-      </p:grpSpPr>
-      <p:sp>
-        <p:nvSpPr>
-          <p:cNvPr id="2" name="Title 1"/>
-          <p:cNvSpPr>
-            <a:spLocks noGrp="1"/>
-          </p:cNvSpPr>
-          <p:nvPr>
-            <p:ph type="title"/>
-          </p:nvPr>
-        </p:nvSpPr>
-        <p:spPr/>
-        <p:txBody>
-          <a:bodyPr/>
-          <a:lstStyle/>
-          <a:p>
-            <a:r>
-              <a:rPr lang="en-AU" dirty="0" smtClean="0"/>
-              <a:t>Things to fix/change - Translation</a:t>
-            </a:r>
-            <a:endParaRPr lang="en-AU" dirty="0"/>
-          </a:p>
-        </p:txBody>
-      </p:sp>
-      <p:sp>
-        <p:nvSpPr>
-          <p:cNvPr id="3" name="Content Placeholder 2"/>
-          <p:cNvSpPr>
-            <a:spLocks noGrp="1"/>
-          </p:cNvSpPr>
-          <p:nvPr>
-            <p:ph idx="1"/>
-          </p:nvPr>
-        </p:nvSpPr>
-        <p:spPr>
-          <a:xfrm>
-            <a:off x="457200" y="1600200"/>
-            <a:ext cx="8229600" cy="4925144"/>
-          </a:xfrm>
-        </p:spPr>
-        <p:txBody>
-          <a:bodyPr>
-            <a:normAutofit fontScale="92500" lnSpcReduction="10000"/>
-          </a:bodyPr>
-          <a:lstStyle/>
-          <a:p>
-            <a:r>
-              <a:rPr lang="en-AU" dirty="0" smtClean="0"/>
-              <a:t>Antibiotic effects: drive ribosome disassembly/block </a:t>
-            </a:r>
-            <a:r>
-              <a:rPr lang="en-AU" dirty="0" err="1" smtClean="0"/>
-              <a:t>ribsome</a:t>
-            </a:r>
-            <a:r>
-              <a:rPr lang="en-AU" dirty="0" smtClean="0"/>
-              <a:t> assembly?</a:t>
-            </a:r>
-          </a:p>
-          <a:p>
-            <a:pPr lvl="1"/>
-            <a:r>
-              <a:rPr lang="en-AU" dirty="0" smtClean="0"/>
-              <a:t>Currently in protein activation submodule</a:t>
-            </a:r>
-          </a:p>
-          <a:p>
-            <a:endParaRPr lang="en-AU" dirty="0"/>
-          </a:p>
-          <a:p>
-            <a:r>
-              <a:rPr lang="en-AU" dirty="0" smtClean="0"/>
-              <a:t>Translation reactions should be built from mRNA sequence (rather than protein sequence) to allow for mutations</a:t>
-            </a:r>
-          </a:p>
-          <a:p>
-            <a:endParaRPr lang="en-AU" dirty="0"/>
-          </a:p>
-          <a:p>
-            <a:r>
-              <a:rPr lang="en-AU" dirty="0" smtClean="0"/>
-              <a:t>EF-P: catalyses attachment of </a:t>
-            </a:r>
-            <a:r>
-              <a:rPr lang="en-AU" dirty="0" err="1" smtClean="0"/>
-              <a:t>fMET</a:t>
-            </a:r>
-            <a:r>
-              <a:rPr lang="en-AU" dirty="0" smtClean="0"/>
-              <a:t> to 2</a:t>
-            </a:r>
-            <a:r>
-              <a:rPr lang="en-AU" baseline="30000" dirty="0" smtClean="0"/>
-              <a:t>nd</a:t>
-            </a:r>
-            <a:r>
-              <a:rPr lang="en-AU" dirty="0" smtClean="0"/>
-              <a:t> amino acid</a:t>
-            </a:r>
-            <a:endParaRPr lang="en-AU" dirty="0"/>
-          </a:p>
-        </p:txBody>
-      </p:sp>
-    </p:spTree>
-    <p:extLst>
-      <p:ext uri="{BB962C8B-B14F-4D97-AF65-F5344CB8AC3E}">
-        <p14:creationId xmlns:p14="http://schemas.microsoft.com/office/powerpoint/2010/main" val="3498815092"/>
-      </p:ext>
-    </p:extLst>
-  </p:cSld>
-  <p:clrMapOvr>
-    <a:masterClrMapping/>
-  </p:clrMapOvr>
-</p:sld>
-</file>
-
 <file path=ppt/slides/slide9.xml><?xml version="1.0" encoding="utf-8"?>
 <p:sld xmlns:a="http://schemas.openxmlformats.org/drawingml/2006/main" xmlns:r="http://schemas.openxmlformats.org/officeDocument/2006/relationships" xmlns:p="http://schemas.openxmlformats.org/presentationml/2006/main">
   <p:cSld>
@@ -4579,14 +4737,22 @@
           <a:p>
             <a:r>
               <a:rPr lang="en-AU" dirty="0" smtClean="0"/>
-              <a:t>Limit maximum extension within a single model iteration</a:t>
+              <a:t>Antibiotic effects: drive ribosome disassembly/block </a:t>
+            </a:r>
+            <a:r>
+              <a:rPr lang="en-AU" dirty="0" err="1" smtClean="0"/>
+              <a:t>ribsome</a:t>
+            </a:r>
+            <a:r>
+              <a:rPr lang="en-AU" dirty="0" smtClean="0"/>
+              <a:t> assembly?</a:t>
             </a:r>
           </a:p>
           <a:p>
             <a:pPr lvl="1"/>
             <a:r>
               <a:rPr lang="en-AU" dirty="0" smtClean="0"/>
-              <a:t>Unlikely, but possible with Gillespie algorithm that a single amino acid + ribosome extends more than possible</a:t>
+              <a:t>Currently in protein activation submodule</a:t>
             </a:r>
           </a:p>
           <a:p>
@@ -4595,47 +4761,32 @@
           <a:p>
             <a:r>
               <a:rPr lang="en-AU" dirty="0" smtClean="0"/>
-              <a:t>Define module requirements for integration</a:t>
-            </a:r>
-          </a:p>
-          <a:p>
-            <a:pPr lvl="1"/>
-            <a:r>
-              <a:rPr lang="en-AU" dirty="0" smtClean="0"/>
-              <a:t>Jonathan’s talk:</a:t>
-            </a:r>
-          </a:p>
-          <a:p>
-            <a:pPr lvl="2"/>
-            <a:r>
-              <a:rPr lang="en-AU" dirty="0" smtClean="0"/>
-              <a:t>Translation: 29% of ATP</a:t>
-            </a:r>
-          </a:p>
-          <a:p>
-            <a:pPr lvl="2"/>
+              <a:t>Translation reactions should be built from mRNA sequence (rather than protein sequence) to allow for mutations</a:t>
+            </a:r>
+          </a:p>
+          <a:p>
+            <a:endParaRPr lang="en-AU" dirty="0"/>
+          </a:p>
+          <a:p>
+            <a:r>
+              <a:rPr lang="en-AU" dirty="0" smtClean="0"/>
+              <a:t>EF-P: catalyses attachment of </a:t>
+            </a:r>
             <a:r>
               <a:rPr lang="en-AU" dirty="0" err="1" smtClean="0"/>
-              <a:t>tRNA</a:t>
-            </a:r>
-            <a:r>
-              <a:rPr lang="en-AU" dirty="0" smtClean="0"/>
-              <a:t> </a:t>
-            </a:r>
-            <a:r>
-              <a:rPr lang="en-AU" dirty="0" err="1" smtClean="0"/>
-              <a:t>aminoacylation</a:t>
-            </a:r>
-            <a:r>
-              <a:rPr lang="en-AU" dirty="0" smtClean="0"/>
-              <a:t>: 15.1% of ATP</a:t>
-            </a:r>
-          </a:p>
-          <a:p>
-            <a:pPr lvl="2"/>
-            <a:r>
-              <a:rPr lang="en-AU" dirty="0" smtClean="0"/>
-              <a:t>Unknown: ~40%(?) of ATP</a:t>
+              <a:t>fMET</a:t>
+            </a:r>
+            <a:r>
+              <a:rPr lang="en-AU" dirty="0" smtClean="0"/>
+              <a:t> to 2</a:t>
+            </a:r>
+            <a:r>
+              <a:rPr lang="en-AU" baseline="30000" dirty="0" smtClean="0"/>
+              <a:t>nd</a:t>
+            </a:r>
+            <a:r>
+              <a:rPr lang="en-AU" dirty="0" smtClean="0"/>
+              <a:t> amino acid</a:t>
             </a:r>
             <a:endParaRPr lang="en-AU" dirty="0"/>
           </a:p>
@@ -4644,7 +4795,7 @@
     </p:spTree>
     <p:extLst>
       <p:ext uri="{BB962C8B-B14F-4D97-AF65-F5344CB8AC3E}">
-        <p14:creationId xmlns:p14="http://schemas.microsoft.com/office/powerpoint/2010/main" val="1456272442"/>
+        <p14:creationId xmlns:p14="http://schemas.microsoft.com/office/powerpoint/2010/main" val="3498815092"/>
       </p:ext>
     </p:extLst>
   </p:cSld>

</xml_diff>

<commit_message>
Added diagram from Denis to presentation
Added schematic diagram of protein translation as created by Denis,
added further comment on how to maybe reduce the number of reactions
</commit_message>
<xml_diff>
--- a/translation_finalPres.pptx
+++ b/translation_finalPres.pptx
@@ -3300,7 +3300,7 @@
         </p:spPr>
         <p:txBody>
           <a:bodyPr>
-            <a:normAutofit fontScale="92500" lnSpcReduction="10000"/>
+            <a:normAutofit fontScale="85000" lnSpcReduction="10000"/>
           </a:bodyPr>
           <a:lstStyle/>
           <a:p>
@@ -3313,8 +3313,20 @@
             <a:pPr lvl="1"/>
             <a:r>
               <a:rPr lang="en-AU" dirty="0" smtClean="0"/>
-              <a:t>Unlikely, but possible with Gillespie algorithm that a single amino acid + ribosome extends more than possible</a:t>
-            </a:r>
+              <a:t>Unlikely, but possible with Gillespie algorithm that a single amino acid + ribosome extends more than </a:t>
+            </a:r>
+            <a:r>
+              <a:rPr lang="en-AU" dirty="0" smtClean="0"/>
+              <a:t>possible</a:t>
+            </a:r>
+          </a:p>
+          <a:p>
+            <a:pPr lvl="1"/>
+            <a:r>
+              <a:rPr lang="en-AU" dirty="0" smtClean="0"/>
+              <a:t>Could maybe reduce number of reactions (e.g. add blocks of amino acids), or single reaction with slower reaction</a:t>
+            </a:r>
+            <a:endParaRPr lang="en-AU" dirty="0" smtClean="0"/>
           </a:p>
           <a:p>
             <a:endParaRPr lang="en-AU" dirty="0"/>
@@ -3631,13 +3643,8 @@
           <a:p>
             <a:r>
               <a:rPr lang="en-AU" dirty="0" smtClean="0"/>
-              <a:t>As specified by Jonathan (30 odd reactions</a:t>
-            </a:r>
-            <a:r>
-              <a:rPr lang="en-AU" dirty="0" smtClean="0"/>
-              <a:t>)</a:t>
-            </a:r>
-            <a:endParaRPr lang="en-AU" dirty="0" smtClean="0"/>
+              <a:t>As specified by Jonathan (30 odd reactions)</a:t>
+            </a:r>
           </a:p>
         </p:txBody>
       </p:sp>
@@ -3924,16 +3931,75 @@
             </a:r>
             <a:r>
               <a:rPr lang="en-AU" dirty="0" smtClean="0"/>
-              <a:t> script using protein </a:t>
-            </a:r>
-            <a:r>
-              <a:rPr lang="en-AU" dirty="0" smtClean="0"/>
-              <a:t>sequences</a:t>
-            </a:r>
-            <a:endParaRPr lang="en-AU" dirty="0" smtClean="0"/>
-          </a:p>
-        </p:txBody>
-      </p:sp>
+              <a:t> script using protein sequences</a:t>
+            </a:r>
+          </a:p>
+        </p:txBody>
+      </p:sp>
+      <p:pic>
+        <p:nvPicPr>
+          <p:cNvPr id="1026" name="Picture 2"/>
+          <p:cNvPicPr>
+            <a:picLocks noChangeAspect="1" noChangeArrowheads="1"/>
+          </p:cNvPicPr>
+          <p:nvPr/>
+        </p:nvPicPr>
+        <p:blipFill>
+          <a:blip r:embed="rId2" cstate="print">
+            <a:extLst>
+              <a:ext uri="{28A0092B-C50C-407E-A947-70E740481C1C}">
+                <a14:useLocalDpi xmlns:a14="http://schemas.microsoft.com/office/drawing/2010/main" val="0"/>
+              </a:ext>
+            </a:extLst>
+          </a:blip>
+          <a:srcRect/>
+          <a:stretch>
+            <a:fillRect/>
+          </a:stretch>
+        </p:blipFill>
+        <p:spPr bwMode="auto">
+          <a:xfrm>
+            <a:off x="1475656" y="4196502"/>
+            <a:ext cx="6192688" cy="2306131"/>
+          </a:xfrm>
+          <a:prstGeom prst="rect">
+            <a:avLst/>
+          </a:prstGeom>
+          <a:noFill/>
+          <a:ln>
+            <a:noFill/>
+          </a:ln>
+          <a:effectLst/>
+          <a:extLst>
+            <a:ext uri="{909E8E84-426E-40DD-AFC4-6F175D3DCCD1}">
+              <a14:hiddenFill xmlns:a14="http://schemas.microsoft.com/office/drawing/2010/main">
+                <a:solidFill>
+                  <a:schemeClr val="accent1"/>
+                </a:solidFill>
+              </a14:hiddenFill>
+            </a:ext>
+            <a:ext uri="{91240B29-F687-4F45-9708-019B960494DF}">
+              <a14:hiddenLine xmlns:a14="http://schemas.microsoft.com/office/drawing/2010/main" w="9525">
+                <a:solidFill>
+                  <a:schemeClr val="tx1"/>
+                </a:solidFill>
+                <a:miter lim="800000"/>
+                <a:headEnd/>
+                <a:tailEnd/>
+              </a14:hiddenLine>
+            </a:ext>
+            <a:ext uri="{AF507438-7753-43E0-B8FC-AC1667EBCBE1}">
+              <a14:hiddenEffects xmlns:a14="http://schemas.microsoft.com/office/drawing/2010/main">
+                <a:effectLst>
+                  <a:outerShdw dist="35921" dir="2700000" algn="ctr" rotWithShape="0">
+                    <a:schemeClr val="bg2"/>
+                  </a:outerShdw>
+                </a:effectLst>
+              </a14:hiddenEffects>
+            </a:ext>
+          </a:extLst>
+        </p:spPr>
+      </p:pic>
     </p:spTree>
     <p:extLst>
       <p:ext uri="{BB962C8B-B14F-4D97-AF65-F5344CB8AC3E}">

</xml_diff>

<commit_message>
PPT slides presented for summary
Final upload of the powerpoint slides shown during the final
presentation.
</commit_message>
<xml_diff>
--- a/translation_finalPres.pptx
+++ b/translation_finalPres.pptx
@@ -6,16 +6,18 @@
   </p:sldMasterIdLst>
   <p:sldIdLst>
     <p:sldId id="256" r:id="rId2"/>
-    <p:sldId id="262" r:id="rId3"/>
-    <p:sldId id="265" r:id="rId4"/>
-    <p:sldId id="264" r:id="rId5"/>
-    <p:sldId id="266" r:id="rId6"/>
-    <p:sldId id="263" r:id="rId7"/>
-    <p:sldId id="257" r:id="rId8"/>
-    <p:sldId id="258" r:id="rId9"/>
-    <p:sldId id="260" r:id="rId10"/>
-    <p:sldId id="261" r:id="rId11"/>
-    <p:sldId id="259" r:id="rId12"/>
+    <p:sldId id="267" r:id="rId3"/>
+    <p:sldId id="262" r:id="rId4"/>
+    <p:sldId id="265" r:id="rId5"/>
+    <p:sldId id="268" r:id="rId6"/>
+    <p:sldId id="264" r:id="rId7"/>
+    <p:sldId id="266" r:id="rId8"/>
+    <p:sldId id="263" r:id="rId9"/>
+    <p:sldId id="257" r:id="rId10"/>
+    <p:sldId id="258" r:id="rId11"/>
+    <p:sldId id="260" r:id="rId12"/>
+    <p:sldId id="261" r:id="rId13"/>
+    <p:sldId id="259" r:id="rId14"/>
   </p:sldIdLst>
   <p:sldSz cx="9144000" cy="6858000" type="screen4x3"/>
   <p:notesSz cx="6858000" cy="9144000"/>
@@ -3239,1285 +3241,17 @@
   <p:clrMapOvr>
     <a:masterClrMapping/>
   </p:clrMapOvr>
+  <p:timing>
+    <p:tnLst>
+      <p:par>
+        <p:cTn id="1" dur="indefinite" restart="never" nodeType="tmRoot"/>
+      </p:par>
+    </p:tnLst>
+  </p:timing>
 </p:sld>
 </file>
 
 <file path=ppt/slides/slide10.xml><?xml version="1.0" encoding="utf-8"?>
-<p:sld xmlns:a="http://schemas.openxmlformats.org/drawingml/2006/main" xmlns:r="http://schemas.openxmlformats.org/officeDocument/2006/relationships" xmlns:p="http://schemas.openxmlformats.org/presentationml/2006/main">
-  <p:cSld>
-    <p:spTree>
-      <p:nvGrpSpPr>
-        <p:cNvPr id="1" name=""/>
-        <p:cNvGrpSpPr/>
-        <p:nvPr/>
-      </p:nvGrpSpPr>
-      <p:grpSpPr>
-        <a:xfrm>
-          <a:off x="0" y="0"/>
-          <a:ext cx="0" cy="0"/>
-          <a:chOff x="0" y="0"/>
-          <a:chExt cx="0" cy="0"/>
-        </a:xfrm>
-      </p:grpSpPr>
-      <p:sp>
-        <p:nvSpPr>
-          <p:cNvPr id="2" name="Title 1"/>
-          <p:cNvSpPr>
-            <a:spLocks noGrp="1"/>
-          </p:cNvSpPr>
-          <p:nvPr>
-            <p:ph type="title"/>
-          </p:nvPr>
-        </p:nvSpPr>
-        <p:spPr/>
-        <p:txBody>
-          <a:bodyPr/>
-          <a:lstStyle/>
-          <a:p>
-            <a:r>
-              <a:rPr lang="en-AU" dirty="0" smtClean="0"/>
-              <a:t>Things to fix/change - Translation</a:t>
-            </a:r>
-            <a:endParaRPr lang="en-AU" dirty="0"/>
-          </a:p>
-        </p:txBody>
-      </p:sp>
-      <p:sp>
-        <p:nvSpPr>
-          <p:cNvPr id="3" name="Content Placeholder 2"/>
-          <p:cNvSpPr>
-            <a:spLocks noGrp="1"/>
-          </p:cNvSpPr>
-          <p:nvPr>
-            <p:ph idx="1"/>
-          </p:nvPr>
-        </p:nvSpPr>
-        <p:spPr>
-          <a:xfrm>
-            <a:off x="457200" y="1600200"/>
-            <a:ext cx="8229600" cy="4925144"/>
-          </a:xfrm>
-        </p:spPr>
-        <p:txBody>
-          <a:bodyPr>
-            <a:normAutofit fontScale="85000" lnSpcReduction="10000"/>
-          </a:bodyPr>
-          <a:lstStyle/>
-          <a:p>
-            <a:r>
-              <a:rPr lang="en-AU" dirty="0" smtClean="0"/>
-              <a:t>Limit maximum extension within a single model iteration</a:t>
-            </a:r>
-          </a:p>
-          <a:p>
-            <a:pPr lvl="1"/>
-            <a:r>
-              <a:rPr lang="en-AU" dirty="0" smtClean="0"/>
-              <a:t>Unlikely, but possible with Gillespie algorithm that a single amino acid + ribosome extends more than </a:t>
-            </a:r>
-            <a:r>
-              <a:rPr lang="en-AU" dirty="0" smtClean="0"/>
-              <a:t>possible</a:t>
-            </a:r>
-          </a:p>
-          <a:p>
-            <a:pPr lvl="1"/>
-            <a:r>
-              <a:rPr lang="en-AU" dirty="0" smtClean="0"/>
-              <a:t>Could maybe reduce number of reactions (e.g. add blocks of amino acids), or single reaction with slower reaction</a:t>
-            </a:r>
-            <a:endParaRPr lang="en-AU" dirty="0" smtClean="0"/>
-          </a:p>
-          <a:p>
-            <a:endParaRPr lang="en-AU" dirty="0"/>
-          </a:p>
-          <a:p>
-            <a:r>
-              <a:rPr lang="en-AU" dirty="0" smtClean="0"/>
-              <a:t>Define module requirements for integration</a:t>
-            </a:r>
-          </a:p>
-          <a:p>
-            <a:pPr lvl="1"/>
-            <a:r>
-              <a:rPr lang="en-AU" dirty="0" smtClean="0"/>
-              <a:t>Jonathan’s talk:</a:t>
-            </a:r>
-          </a:p>
-          <a:p>
-            <a:pPr lvl="2"/>
-            <a:r>
-              <a:rPr lang="en-AU" dirty="0" smtClean="0"/>
-              <a:t>Translation: 29% of ATP</a:t>
-            </a:r>
-          </a:p>
-          <a:p>
-            <a:pPr lvl="2"/>
-            <a:r>
-              <a:rPr lang="en-AU" dirty="0" err="1" smtClean="0"/>
-              <a:t>tRNA</a:t>
-            </a:r>
-            <a:r>
-              <a:rPr lang="en-AU" dirty="0" smtClean="0"/>
-              <a:t> </a:t>
-            </a:r>
-            <a:r>
-              <a:rPr lang="en-AU" dirty="0" err="1" smtClean="0"/>
-              <a:t>aminoacylation</a:t>
-            </a:r>
-            <a:r>
-              <a:rPr lang="en-AU" dirty="0" smtClean="0"/>
-              <a:t>: 15.1% of ATP</a:t>
-            </a:r>
-          </a:p>
-          <a:p>
-            <a:pPr lvl="2"/>
-            <a:r>
-              <a:rPr lang="en-AU" dirty="0" smtClean="0"/>
-              <a:t>Unknown: ~40%(?) of ATP</a:t>
-            </a:r>
-            <a:endParaRPr lang="en-AU" dirty="0"/>
-          </a:p>
-        </p:txBody>
-      </p:sp>
-    </p:spTree>
-    <p:extLst>
-      <p:ext uri="{BB962C8B-B14F-4D97-AF65-F5344CB8AC3E}">
-        <p14:creationId xmlns:p14="http://schemas.microsoft.com/office/powerpoint/2010/main" val="1456272442"/>
-      </p:ext>
-    </p:extLst>
-  </p:cSld>
-  <p:clrMapOvr>
-    <a:masterClrMapping/>
-  </p:clrMapOvr>
-</p:sld>
-</file>
-
-<file path=ppt/slides/slide11.xml><?xml version="1.0" encoding="utf-8"?>
-<p:sld xmlns:a="http://schemas.openxmlformats.org/drawingml/2006/main" xmlns:r="http://schemas.openxmlformats.org/officeDocument/2006/relationships" xmlns:p="http://schemas.openxmlformats.org/presentationml/2006/main">
-  <p:cSld>
-    <p:spTree>
-      <p:nvGrpSpPr>
-        <p:cNvPr id="1" name=""/>
-        <p:cNvGrpSpPr/>
-        <p:nvPr/>
-      </p:nvGrpSpPr>
-      <p:grpSpPr>
-        <a:xfrm>
-          <a:off x="0" y="0"/>
-          <a:ext cx="0" cy="0"/>
-          <a:chOff x="0" y="0"/>
-          <a:chExt cx="0" cy="0"/>
-        </a:xfrm>
-      </p:grpSpPr>
-      <p:sp>
-        <p:nvSpPr>
-          <p:cNvPr id="2" name="Title 1"/>
-          <p:cNvSpPr>
-            <a:spLocks noGrp="1"/>
-          </p:cNvSpPr>
-          <p:nvPr>
-            <p:ph type="title"/>
-          </p:nvPr>
-        </p:nvSpPr>
-        <p:spPr/>
-        <p:txBody>
-          <a:bodyPr/>
-          <a:lstStyle/>
-          <a:p>
-            <a:r>
-              <a:rPr lang="en-AU" dirty="0" smtClean="0"/>
-              <a:t>Things to fix/change</a:t>
-            </a:r>
-            <a:endParaRPr lang="en-AU" dirty="0"/>
-          </a:p>
-        </p:txBody>
-      </p:sp>
-      <p:sp>
-        <p:nvSpPr>
-          <p:cNvPr id="3" name="Content Placeholder 2"/>
-          <p:cNvSpPr>
-            <a:spLocks noGrp="1"/>
-          </p:cNvSpPr>
-          <p:nvPr>
-            <p:ph idx="1"/>
-          </p:nvPr>
-        </p:nvSpPr>
-        <p:spPr>
-          <a:xfrm>
-            <a:off x="457200" y="1600200"/>
-            <a:ext cx="8229600" cy="4853136"/>
-          </a:xfrm>
-        </p:spPr>
-        <p:txBody>
-          <a:bodyPr>
-            <a:normAutofit/>
-          </a:bodyPr>
-          <a:lstStyle/>
-          <a:p>
-            <a:r>
-              <a:rPr lang="en-AU" dirty="0" smtClean="0"/>
-              <a:t>Combine/integrate </a:t>
-            </a:r>
-            <a:r>
-              <a:rPr lang="en-AU" dirty="0" err="1" smtClean="0"/>
-              <a:t>tRNA</a:t>
-            </a:r>
-            <a:r>
-              <a:rPr lang="en-AU" dirty="0" smtClean="0"/>
-              <a:t> </a:t>
-            </a:r>
-            <a:r>
-              <a:rPr lang="en-AU" dirty="0" err="1" smtClean="0"/>
-              <a:t>aminoacylation</a:t>
-            </a:r>
-            <a:r>
-              <a:rPr lang="en-AU" dirty="0" smtClean="0"/>
-              <a:t> and translation into a single SBML model?</a:t>
-            </a:r>
-          </a:p>
-          <a:p>
-            <a:endParaRPr lang="en-AU" dirty="0"/>
-          </a:p>
-          <a:p>
-            <a:endParaRPr lang="en-AU" dirty="0" smtClean="0"/>
-          </a:p>
-          <a:p>
-            <a:endParaRPr lang="en-AU" dirty="0"/>
-          </a:p>
-          <a:p>
-            <a:endParaRPr lang="en-AU" dirty="0" smtClean="0"/>
-          </a:p>
-          <a:p>
-            <a:endParaRPr lang="en-AU" dirty="0"/>
-          </a:p>
-          <a:p>
-            <a:r>
-              <a:rPr lang="en-AU" dirty="0" smtClean="0"/>
-              <a:t>Annotation and further documentation</a:t>
-            </a:r>
-          </a:p>
-          <a:p>
-            <a:pPr marL="0" indent="0">
-              <a:buNone/>
-            </a:pPr>
-            <a:endParaRPr lang="en-AU" dirty="0" smtClean="0"/>
-          </a:p>
-        </p:txBody>
-      </p:sp>
-      <p:pic>
-        <p:nvPicPr>
-          <p:cNvPr id="1027" name="Picture 3"/>
-          <p:cNvPicPr>
-            <a:picLocks noChangeAspect="1" noChangeArrowheads="1"/>
-          </p:cNvPicPr>
-          <p:nvPr/>
-        </p:nvPicPr>
-        <p:blipFill>
-          <a:blip r:embed="rId2">
-            <a:extLst>
-              <a:ext uri="{28A0092B-C50C-407E-A947-70E740481C1C}">
-                <a14:useLocalDpi xmlns:a14="http://schemas.microsoft.com/office/drawing/2010/main" val="0"/>
-              </a:ext>
-            </a:extLst>
-          </a:blip>
-          <a:srcRect/>
-          <a:stretch>
-            <a:fillRect/>
-          </a:stretch>
-        </p:blipFill>
-        <p:spPr bwMode="auto">
-          <a:xfrm>
-            <a:off x="251520" y="2852936"/>
-            <a:ext cx="8755902" cy="2520280"/>
-          </a:xfrm>
-          <a:prstGeom prst="rect">
-            <a:avLst/>
-          </a:prstGeom>
-          <a:noFill/>
-          <a:ln>
-            <a:noFill/>
-          </a:ln>
-          <a:extLst>
-            <a:ext uri="{909E8E84-426E-40DD-AFC4-6F175D3DCCD1}">
-              <a14:hiddenFill xmlns:a14="http://schemas.microsoft.com/office/drawing/2010/main">
-                <a:solidFill>
-                  <a:schemeClr val="accent1"/>
-                </a:solidFill>
-              </a14:hiddenFill>
-            </a:ext>
-            <a:ext uri="{91240B29-F687-4F45-9708-019B960494DF}">
-              <a14:hiddenLine xmlns:a14="http://schemas.microsoft.com/office/drawing/2010/main" w="9525">
-                <a:solidFill>
-                  <a:schemeClr val="tx1"/>
-                </a:solidFill>
-                <a:miter lim="800000"/>
-                <a:headEnd/>
-                <a:tailEnd/>
-              </a14:hiddenLine>
-            </a:ext>
-          </a:extLst>
-        </p:spPr>
-      </p:pic>
-    </p:spTree>
-    <p:extLst>
-      <p:ext uri="{BB962C8B-B14F-4D97-AF65-F5344CB8AC3E}">
-        <p14:creationId xmlns:p14="http://schemas.microsoft.com/office/powerpoint/2010/main" val="3314973919"/>
-      </p:ext>
-    </p:extLst>
-  </p:cSld>
-  <p:clrMapOvr>
-    <a:masterClrMapping/>
-  </p:clrMapOvr>
-</p:sld>
-</file>
-
-<file path=ppt/slides/slide2.xml><?xml version="1.0" encoding="utf-8"?>
-<p:sld xmlns:a="http://schemas.openxmlformats.org/drawingml/2006/main" xmlns:r="http://schemas.openxmlformats.org/officeDocument/2006/relationships" xmlns:p="http://schemas.openxmlformats.org/presentationml/2006/main">
-  <p:cSld>
-    <p:spTree>
-      <p:nvGrpSpPr>
-        <p:cNvPr id="1" name=""/>
-        <p:cNvGrpSpPr/>
-        <p:nvPr/>
-      </p:nvGrpSpPr>
-      <p:grpSpPr>
-        <a:xfrm>
-          <a:off x="0" y="0"/>
-          <a:ext cx="0" cy="0"/>
-          <a:chOff x="0" y="0"/>
-          <a:chExt cx="0" cy="0"/>
-        </a:xfrm>
-      </p:grpSpPr>
-      <p:sp>
-        <p:nvSpPr>
-          <p:cNvPr id="2" name="Title 1"/>
-          <p:cNvSpPr>
-            <a:spLocks noGrp="1"/>
-          </p:cNvSpPr>
-          <p:nvPr>
-            <p:ph type="title"/>
-          </p:nvPr>
-        </p:nvSpPr>
-        <p:spPr/>
-        <p:txBody>
-          <a:bodyPr>
-            <a:normAutofit fontScale="90000"/>
-          </a:bodyPr>
-          <a:lstStyle/>
-          <a:p>
-            <a:r>
-              <a:rPr lang="en-AU" dirty="0" smtClean="0"/>
-              <a:t>Current implementation – </a:t>
-            </a:r>
-            <a:r>
-              <a:rPr lang="en-AU" dirty="0" err="1" smtClean="0"/>
-              <a:t>tRNA</a:t>
-            </a:r>
-            <a:r>
-              <a:rPr lang="en-AU" dirty="0" smtClean="0"/>
-              <a:t> </a:t>
-            </a:r>
-            <a:r>
-              <a:rPr lang="en-AU" dirty="0" err="1" smtClean="0"/>
-              <a:t>aminoacylation</a:t>
-            </a:r>
-            <a:endParaRPr lang="en-AU" dirty="0"/>
-          </a:p>
-        </p:txBody>
-      </p:sp>
-      <p:sp>
-        <p:nvSpPr>
-          <p:cNvPr id="3" name="Content Placeholder 2"/>
-          <p:cNvSpPr>
-            <a:spLocks noGrp="1"/>
-          </p:cNvSpPr>
-          <p:nvPr>
-            <p:ph idx="1"/>
-          </p:nvPr>
-        </p:nvSpPr>
-        <p:spPr/>
-        <p:txBody>
-          <a:bodyPr/>
-          <a:lstStyle/>
-          <a:p>
-            <a:r>
-              <a:rPr lang="en-AU" dirty="0" smtClean="0"/>
-              <a:t>As specified by Jonathan (30 odd reactions)</a:t>
-            </a:r>
-          </a:p>
-        </p:txBody>
-      </p:sp>
-      <p:pic>
-        <p:nvPicPr>
-          <p:cNvPr id="1026" name="Picture 2" descr="C:\wc\2014_VW_modelling_workshop\wholecell-translation\sbgn\aminoacylation.graphml.png"/>
-          <p:cNvPicPr>
-            <a:picLocks noChangeAspect="1" noChangeArrowheads="1"/>
-          </p:cNvPicPr>
-          <p:nvPr/>
-        </p:nvPicPr>
-        <p:blipFill rotWithShape="1">
-          <a:blip r:embed="rId2" cstate="print">
-            <a:extLst>
-              <a:ext uri="{28A0092B-C50C-407E-A947-70E740481C1C}">
-                <a14:useLocalDpi xmlns:a14="http://schemas.microsoft.com/office/drawing/2010/main" val="0"/>
-              </a:ext>
-            </a:extLst>
-          </a:blip>
-          <a:srcRect r="27334"/>
-          <a:stretch/>
-        </p:blipFill>
-        <p:spPr bwMode="auto">
-          <a:xfrm>
-            <a:off x="1979712" y="2276872"/>
-            <a:ext cx="4896544" cy="4402233"/>
-          </a:xfrm>
-          <a:prstGeom prst="rect">
-            <a:avLst/>
-          </a:prstGeom>
-          <a:noFill/>
-          <a:extLst>
-            <a:ext uri="{909E8E84-426E-40DD-AFC4-6F175D3DCCD1}">
-              <a14:hiddenFill xmlns:a14="http://schemas.microsoft.com/office/drawing/2010/main">
-                <a:solidFill>
-                  <a:srgbClr val="FFFFFF"/>
-                </a:solidFill>
-              </a14:hiddenFill>
-            </a:ext>
-          </a:extLst>
-        </p:spPr>
-      </p:pic>
-    </p:spTree>
-    <p:extLst>
-      <p:ext uri="{BB962C8B-B14F-4D97-AF65-F5344CB8AC3E}">
-        <p14:creationId xmlns:p14="http://schemas.microsoft.com/office/powerpoint/2010/main" val="2792140726"/>
-      </p:ext>
-    </p:extLst>
-  </p:cSld>
-  <p:clrMapOvr>
-    <a:masterClrMapping/>
-  </p:clrMapOvr>
-</p:sld>
-</file>
-
-<file path=ppt/slides/slide3.xml><?xml version="1.0" encoding="utf-8"?>
-<p:sld xmlns:a="http://schemas.openxmlformats.org/drawingml/2006/main" xmlns:r="http://schemas.openxmlformats.org/officeDocument/2006/relationships" xmlns:p="http://schemas.openxmlformats.org/presentationml/2006/main">
-  <p:cSld>
-    <p:spTree>
-      <p:nvGrpSpPr>
-        <p:cNvPr id="1" name=""/>
-        <p:cNvGrpSpPr/>
-        <p:nvPr/>
-      </p:nvGrpSpPr>
-      <p:grpSpPr>
-        <a:xfrm>
-          <a:off x="0" y="0"/>
-          <a:ext cx="0" cy="0"/>
-          <a:chOff x="0" y="0"/>
-          <a:chExt cx="0" cy="0"/>
-        </a:xfrm>
-      </p:grpSpPr>
-      <p:sp>
-        <p:nvSpPr>
-          <p:cNvPr id="2" name="Title 1"/>
-          <p:cNvSpPr>
-            <a:spLocks noGrp="1"/>
-          </p:cNvSpPr>
-          <p:nvPr>
-            <p:ph type="title"/>
-          </p:nvPr>
-        </p:nvSpPr>
-        <p:spPr/>
-        <p:txBody>
-          <a:bodyPr>
-            <a:normAutofit fontScale="90000"/>
-          </a:bodyPr>
-          <a:lstStyle/>
-          <a:p>
-            <a:r>
-              <a:rPr lang="en-AU" dirty="0" smtClean="0"/>
-              <a:t>Current implementation – </a:t>
-            </a:r>
-            <a:r>
-              <a:rPr lang="en-AU" dirty="0" err="1" smtClean="0"/>
-              <a:t>tRNA</a:t>
-            </a:r>
-            <a:r>
-              <a:rPr lang="en-AU" dirty="0" smtClean="0"/>
-              <a:t> </a:t>
-            </a:r>
-            <a:r>
-              <a:rPr lang="en-AU" dirty="0" err="1" smtClean="0"/>
-              <a:t>aminoacylation</a:t>
-            </a:r>
-            <a:endParaRPr lang="en-AU" dirty="0"/>
-          </a:p>
-        </p:txBody>
-      </p:sp>
-      <p:sp>
-        <p:nvSpPr>
-          <p:cNvPr id="3" name="Content Placeholder 2"/>
-          <p:cNvSpPr>
-            <a:spLocks noGrp="1"/>
-          </p:cNvSpPr>
-          <p:nvPr>
-            <p:ph idx="1"/>
-          </p:nvPr>
-        </p:nvSpPr>
-        <p:spPr/>
-        <p:txBody>
-          <a:bodyPr/>
-          <a:lstStyle/>
-          <a:p>
-            <a:r>
-              <a:rPr lang="en-AU" dirty="0" smtClean="0"/>
-              <a:t>SBML model opens/runs in COPASI</a:t>
-            </a:r>
-          </a:p>
-          <a:p>
-            <a:pPr lvl="1"/>
-            <a:r>
-              <a:rPr lang="en-AU" dirty="0" smtClean="0"/>
-              <a:t>Very rapid (instant?) processes? Conversion of MET_MG488 to fMET_488</a:t>
-            </a:r>
-          </a:p>
-          <a:p>
-            <a:endParaRPr lang="en-AU" dirty="0"/>
-          </a:p>
-        </p:txBody>
-      </p:sp>
-      <p:pic>
-        <p:nvPicPr>
-          <p:cNvPr id="2051" name="Picture 3"/>
-          <p:cNvPicPr>
-            <a:picLocks noChangeAspect="1" noChangeArrowheads="1"/>
-          </p:cNvPicPr>
-          <p:nvPr/>
-        </p:nvPicPr>
-        <p:blipFill rotWithShape="1">
-          <a:blip r:embed="rId2">
-            <a:extLst>
-              <a:ext uri="{28A0092B-C50C-407E-A947-70E740481C1C}">
-                <a14:useLocalDpi xmlns:a14="http://schemas.microsoft.com/office/drawing/2010/main" val="0"/>
-              </a:ext>
-            </a:extLst>
-          </a:blip>
-          <a:srcRect l="26574" t="25852" r="26574" b="17329"/>
-          <a:stretch/>
-        </p:blipFill>
-        <p:spPr bwMode="auto">
-          <a:xfrm>
-            <a:off x="2051720" y="3135269"/>
-            <a:ext cx="5184575" cy="3534938"/>
-          </a:xfrm>
-          <a:prstGeom prst="rect">
-            <a:avLst/>
-          </a:prstGeom>
-          <a:noFill/>
-          <a:ln>
-            <a:noFill/>
-          </a:ln>
-          <a:extLst>
-            <a:ext uri="{909E8E84-426E-40DD-AFC4-6F175D3DCCD1}">
-              <a14:hiddenFill xmlns:a14="http://schemas.microsoft.com/office/drawing/2010/main">
-                <a:solidFill>
-                  <a:schemeClr val="accent1"/>
-                </a:solidFill>
-              </a14:hiddenFill>
-            </a:ext>
-            <a:ext uri="{91240B29-F687-4F45-9708-019B960494DF}">
-              <a14:hiddenLine xmlns:a14="http://schemas.microsoft.com/office/drawing/2010/main" w="9525">
-                <a:solidFill>
-                  <a:schemeClr val="tx1"/>
-                </a:solidFill>
-                <a:miter lim="800000"/>
-                <a:headEnd/>
-                <a:tailEnd/>
-              </a14:hiddenLine>
-            </a:ext>
-          </a:extLst>
-        </p:spPr>
-      </p:pic>
-    </p:spTree>
-    <p:extLst>
-      <p:ext uri="{BB962C8B-B14F-4D97-AF65-F5344CB8AC3E}">
-        <p14:creationId xmlns:p14="http://schemas.microsoft.com/office/powerpoint/2010/main" val="3606207520"/>
-      </p:ext>
-    </p:extLst>
-  </p:cSld>
-  <p:clrMapOvr>
-    <a:masterClrMapping/>
-  </p:clrMapOvr>
-</p:sld>
-</file>
-
-<file path=ppt/slides/slide4.xml><?xml version="1.0" encoding="utf-8"?>
-<p:sld xmlns:a="http://schemas.openxmlformats.org/drawingml/2006/main" xmlns:r="http://schemas.openxmlformats.org/officeDocument/2006/relationships" xmlns:p="http://schemas.openxmlformats.org/presentationml/2006/main">
-  <p:cSld>
-    <p:spTree>
-      <p:nvGrpSpPr>
-        <p:cNvPr id="1" name=""/>
-        <p:cNvGrpSpPr/>
-        <p:nvPr/>
-      </p:nvGrpSpPr>
-      <p:grpSpPr>
-        <a:xfrm>
-          <a:off x="0" y="0"/>
-          <a:ext cx="0" cy="0"/>
-          <a:chOff x="0" y="0"/>
-          <a:chExt cx="0" cy="0"/>
-        </a:xfrm>
-      </p:grpSpPr>
-      <p:sp>
-        <p:nvSpPr>
-          <p:cNvPr id="2" name="Title 1"/>
-          <p:cNvSpPr>
-            <a:spLocks noGrp="1"/>
-          </p:cNvSpPr>
-          <p:nvPr>
-            <p:ph type="title"/>
-          </p:nvPr>
-        </p:nvSpPr>
-        <p:spPr/>
-        <p:txBody>
-          <a:bodyPr>
-            <a:normAutofit fontScale="90000"/>
-          </a:bodyPr>
-          <a:lstStyle/>
-          <a:p>
-            <a:r>
-              <a:rPr lang="en-AU" dirty="0" smtClean="0"/>
-              <a:t>Current implementation – Translation</a:t>
-            </a:r>
-            <a:endParaRPr lang="en-AU" dirty="0"/>
-          </a:p>
-        </p:txBody>
-      </p:sp>
-      <p:sp>
-        <p:nvSpPr>
-          <p:cNvPr id="3" name="Content Placeholder 2"/>
-          <p:cNvSpPr>
-            <a:spLocks noGrp="1"/>
-          </p:cNvSpPr>
-          <p:nvPr>
-            <p:ph idx="1"/>
-          </p:nvPr>
-        </p:nvSpPr>
-        <p:spPr/>
-        <p:txBody>
-          <a:bodyPr/>
-          <a:lstStyle/>
-          <a:p>
-            <a:r>
-              <a:rPr lang="en-AU" dirty="0" smtClean="0"/>
-              <a:t>As specified by Jonathan</a:t>
-            </a:r>
-          </a:p>
-          <a:p>
-            <a:r>
-              <a:rPr lang="en-AU" dirty="0" smtClean="0"/>
-              <a:t>Define variables/reactions for stepwise (per amino acid) elongation of every polypeptide</a:t>
-            </a:r>
-          </a:p>
-          <a:p>
-            <a:pPr lvl="1"/>
-            <a:r>
-              <a:rPr lang="en-AU" dirty="0" smtClean="0"/>
-              <a:t>Created by </a:t>
-            </a:r>
-            <a:r>
-              <a:rPr lang="en-AU" dirty="0" err="1" smtClean="0"/>
-              <a:t>python.libSBML</a:t>
-            </a:r>
-            <a:r>
-              <a:rPr lang="en-AU" dirty="0" smtClean="0"/>
-              <a:t> script using protein sequences</a:t>
-            </a:r>
-          </a:p>
-        </p:txBody>
-      </p:sp>
-      <p:pic>
-        <p:nvPicPr>
-          <p:cNvPr id="1026" name="Picture 2"/>
-          <p:cNvPicPr>
-            <a:picLocks noChangeAspect="1" noChangeArrowheads="1"/>
-          </p:cNvPicPr>
-          <p:nvPr/>
-        </p:nvPicPr>
-        <p:blipFill>
-          <a:blip r:embed="rId2" cstate="print">
-            <a:extLst>
-              <a:ext uri="{28A0092B-C50C-407E-A947-70E740481C1C}">
-                <a14:useLocalDpi xmlns:a14="http://schemas.microsoft.com/office/drawing/2010/main" val="0"/>
-              </a:ext>
-            </a:extLst>
-          </a:blip>
-          <a:srcRect/>
-          <a:stretch>
-            <a:fillRect/>
-          </a:stretch>
-        </p:blipFill>
-        <p:spPr bwMode="auto">
-          <a:xfrm>
-            <a:off x="1475656" y="4196502"/>
-            <a:ext cx="6192688" cy="2306131"/>
-          </a:xfrm>
-          <a:prstGeom prst="rect">
-            <a:avLst/>
-          </a:prstGeom>
-          <a:noFill/>
-          <a:ln>
-            <a:noFill/>
-          </a:ln>
-          <a:effectLst/>
-          <a:extLst>
-            <a:ext uri="{909E8E84-426E-40DD-AFC4-6F175D3DCCD1}">
-              <a14:hiddenFill xmlns:a14="http://schemas.microsoft.com/office/drawing/2010/main">
-                <a:solidFill>
-                  <a:schemeClr val="accent1"/>
-                </a:solidFill>
-              </a14:hiddenFill>
-            </a:ext>
-            <a:ext uri="{91240B29-F687-4F45-9708-019B960494DF}">
-              <a14:hiddenLine xmlns:a14="http://schemas.microsoft.com/office/drawing/2010/main" w="9525">
-                <a:solidFill>
-                  <a:schemeClr val="tx1"/>
-                </a:solidFill>
-                <a:miter lim="800000"/>
-                <a:headEnd/>
-                <a:tailEnd/>
-              </a14:hiddenLine>
-            </a:ext>
-            <a:ext uri="{AF507438-7753-43E0-B8FC-AC1667EBCBE1}">
-              <a14:hiddenEffects xmlns:a14="http://schemas.microsoft.com/office/drawing/2010/main">
-                <a:effectLst>
-                  <a:outerShdw dist="35921" dir="2700000" algn="ctr" rotWithShape="0">
-                    <a:schemeClr val="bg2"/>
-                  </a:outerShdw>
-                </a:effectLst>
-              </a14:hiddenEffects>
-            </a:ext>
-          </a:extLst>
-        </p:spPr>
-      </p:pic>
-    </p:spTree>
-    <p:extLst>
-      <p:ext uri="{BB962C8B-B14F-4D97-AF65-F5344CB8AC3E}">
-        <p14:creationId xmlns:p14="http://schemas.microsoft.com/office/powerpoint/2010/main" val="3580135939"/>
-      </p:ext>
-    </p:extLst>
-  </p:cSld>
-  <p:clrMapOvr>
-    <a:masterClrMapping/>
-  </p:clrMapOvr>
-</p:sld>
-</file>
-
-<file path=ppt/slides/slide5.xml><?xml version="1.0" encoding="utf-8"?>
-<p:sld xmlns:a="http://schemas.openxmlformats.org/drawingml/2006/main" xmlns:r="http://schemas.openxmlformats.org/officeDocument/2006/relationships" xmlns:p="http://schemas.openxmlformats.org/presentationml/2006/main">
-  <p:cSld>
-    <p:spTree>
-      <p:nvGrpSpPr>
-        <p:cNvPr id="1" name=""/>
-        <p:cNvGrpSpPr/>
-        <p:nvPr/>
-      </p:nvGrpSpPr>
-      <p:grpSpPr>
-        <a:xfrm>
-          <a:off x="0" y="0"/>
-          <a:ext cx="0" cy="0"/>
-          <a:chOff x="0" y="0"/>
-          <a:chExt cx="0" cy="0"/>
-        </a:xfrm>
-      </p:grpSpPr>
-      <p:sp>
-        <p:nvSpPr>
-          <p:cNvPr id="2" name="Title 1"/>
-          <p:cNvSpPr>
-            <a:spLocks noGrp="1"/>
-          </p:cNvSpPr>
-          <p:nvPr>
-            <p:ph type="title"/>
-          </p:nvPr>
-        </p:nvSpPr>
-        <p:spPr/>
-        <p:txBody>
-          <a:bodyPr>
-            <a:normAutofit fontScale="90000"/>
-          </a:bodyPr>
-          <a:lstStyle/>
-          <a:p>
-            <a:r>
-              <a:rPr lang="en-AU" dirty="0" smtClean="0"/>
-              <a:t>Current implementation – Translation</a:t>
-            </a:r>
-            <a:endParaRPr lang="en-AU" dirty="0"/>
-          </a:p>
-        </p:txBody>
-      </p:sp>
-      <p:sp>
-        <p:nvSpPr>
-          <p:cNvPr id="3" name="Content Placeholder 2"/>
-          <p:cNvSpPr>
-            <a:spLocks noGrp="1"/>
-          </p:cNvSpPr>
-          <p:nvPr>
-            <p:ph idx="1"/>
-          </p:nvPr>
-        </p:nvSpPr>
-        <p:spPr/>
-        <p:txBody>
-          <a:bodyPr/>
-          <a:lstStyle/>
-          <a:p>
-            <a:endParaRPr lang="en-AU" dirty="0" smtClean="0"/>
-          </a:p>
-        </p:txBody>
-      </p:sp>
-      <p:pic>
-        <p:nvPicPr>
-          <p:cNvPr id="2050" name="Picture 2" descr="C:\wc\2014_VW_modelling_workshop\wholecell-translation\sbgn\translation_withOmittedProcess_3.graphml.png"/>
-          <p:cNvPicPr>
-            <a:picLocks noChangeAspect="1" noChangeArrowheads="1"/>
-          </p:cNvPicPr>
-          <p:nvPr/>
-        </p:nvPicPr>
-        <p:blipFill>
-          <a:blip r:embed="rId2" cstate="print">
-            <a:extLst>
-              <a:ext uri="{28A0092B-C50C-407E-A947-70E740481C1C}">
-                <a14:useLocalDpi xmlns:a14="http://schemas.microsoft.com/office/drawing/2010/main" val="0"/>
-              </a:ext>
-            </a:extLst>
-          </a:blip>
-          <a:srcRect/>
-          <a:stretch>
-            <a:fillRect/>
-          </a:stretch>
-        </p:blipFill>
-        <p:spPr bwMode="auto">
-          <a:xfrm>
-            <a:off x="539552" y="1628800"/>
-            <a:ext cx="8119799" cy="3816424"/>
-          </a:xfrm>
-          <a:prstGeom prst="rect">
-            <a:avLst/>
-          </a:prstGeom>
-          <a:noFill/>
-          <a:extLst>
-            <a:ext uri="{909E8E84-426E-40DD-AFC4-6F175D3DCCD1}">
-              <a14:hiddenFill xmlns:a14="http://schemas.microsoft.com/office/drawing/2010/main">
-                <a:solidFill>
-                  <a:srgbClr val="FFFFFF"/>
-                </a:solidFill>
-              </a14:hiddenFill>
-            </a:ext>
-          </a:extLst>
-        </p:spPr>
-      </p:pic>
-    </p:spTree>
-    <p:extLst>
-      <p:ext uri="{BB962C8B-B14F-4D97-AF65-F5344CB8AC3E}">
-        <p14:creationId xmlns:p14="http://schemas.microsoft.com/office/powerpoint/2010/main" val="2597699786"/>
-      </p:ext>
-    </p:extLst>
-  </p:cSld>
-  <p:clrMapOvr>
-    <a:masterClrMapping/>
-  </p:clrMapOvr>
-</p:sld>
-</file>
-
-<file path=ppt/slides/slide6.xml><?xml version="1.0" encoding="utf-8"?>
-<p:sld xmlns:a="http://schemas.openxmlformats.org/drawingml/2006/main" xmlns:r="http://schemas.openxmlformats.org/officeDocument/2006/relationships" xmlns:p="http://schemas.openxmlformats.org/presentationml/2006/main">
-  <p:cSld>
-    <p:spTree>
-      <p:nvGrpSpPr>
-        <p:cNvPr id="1" name=""/>
-        <p:cNvGrpSpPr/>
-        <p:nvPr/>
-      </p:nvGrpSpPr>
-      <p:grpSpPr>
-        <a:xfrm>
-          <a:off x="0" y="0"/>
-          <a:ext cx="0" cy="0"/>
-          <a:chOff x="0" y="0"/>
-          <a:chExt cx="0" cy="0"/>
-        </a:xfrm>
-      </p:grpSpPr>
-      <p:sp>
-        <p:nvSpPr>
-          <p:cNvPr id="2" name="Title 1"/>
-          <p:cNvSpPr>
-            <a:spLocks noGrp="1"/>
-          </p:cNvSpPr>
-          <p:nvPr>
-            <p:ph type="title"/>
-          </p:nvPr>
-        </p:nvSpPr>
-        <p:spPr/>
-        <p:txBody>
-          <a:bodyPr/>
-          <a:lstStyle/>
-          <a:p>
-            <a:r>
-              <a:rPr lang="en-AU" dirty="0" smtClean="0"/>
-              <a:t>Current Implementation</a:t>
-            </a:r>
-            <a:endParaRPr lang="en-AU" dirty="0"/>
-          </a:p>
-        </p:txBody>
-      </p:sp>
-      <p:sp>
-        <p:nvSpPr>
-          <p:cNvPr id="3" name="Content Placeholder 2"/>
-          <p:cNvSpPr>
-            <a:spLocks noGrp="1"/>
-          </p:cNvSpPr>
-          <p:nvPr>
-            <p:ph idx="1"/>
-          </p:nvPr>
-        </p:nvSpPr>
-        <p:spPr/>
-        <p:txBody>
-          <a:bodyPr/>
-          <a:lstStyle/>
-          <a:p>
-            <a:r>
-              <a:rPr lang="en-AU" dirty="0" smtClean="0"/>
-              <a:t>Avoid stochastic process by applying Gillespie algorithm</a:t>
-            </a:r>
-          </a:p>
-          <a:p>
-            <a:pPr lvl="1"/>
-            <a:r>
-              <a:rPr lang="en-AU" dirty="0" smtClean="0"/>
-              <a:t>Handles relative likelihoods of alternative reactions, weighted by concentrations</a:t>
-            </a:r>
-          </a:p>
-          <a:p>
-            <a:pPr lvl="1"/>
-            <a:r>
-              <a:rPr lang="en-AU" dirty="0" smtClean="0"/>
-              <a:t>More natural SBML representation, but very large SBML files (long time to parse; much greater memory requirements; greatly reduced run times in the absence of ‘sparse matrix’ representation)</a:t>
-            </a:r>
-            <a:endParaRPr lang="en-AU" dirty="0"/>
-          </a:p>
-        </p:txBody>
-      </p:sp>
-    </p:spTree>
-    <p:extLst>
-      <p:ext uri="{BB962C8B-B14F-4D97-AF65-F5344CB8AC3E}">
-        <p14:creationId xmlns:p14="http://schemas.microsoft.com/office/powerpoint/2010/main" val="2148760098"/>
-      </p:ext>
-    </p:extLst>
-  </p:cSld>
-  <p:clrMapOvr>
-    <a:masterClrMapping/>
-  </p:clrMapOvr>
-</p:sld>
-</file>
-
-<file path=ppt/slides/slide7.xml><?xml version="1.0" encoding="utf-8"?>
-<p:sld xmlns:a="http://schemas.openxmlformats.org/drawingml/2006/main" xmlns:r="http://schemas.openxmlformats.org/officeDocument/2006/relationships" xmlns:p="http://schemas.openxmlformats.org/presentationml/2006/main">
-  <p:cSld>
-    <p:spTree>
-      <p:nvGrpSpPr>
-        <p:cNvPr id="1" name=""/>
-        <p:cNvGrpSpPr/>
-        <p:nvPr/>
-      </p:nvGrpSpPr>
-      <p:grpSpPr>
-        <a:xfrm>
-          <a:off x="0" y="0"/>
-          <a:ext cx="0" cy="0"/>
-          <a:chOff x="0" y="0"/>
-          <a:chExt cx="0" cy="0"/>
-        </a:xfrm>
-      </p:grpSpPr>
-      <p:sp>
-        <p:nvSpPr>
-          <p:cNvPr id="2" name="Title 1"/>
-          <p:cNvSpPr>
-            <a:spLocks noGrp="1"/>
-          </p:cNvSpPr>
-          <p:nvPr>
-            <p:ph type="title"/>
-          </p:nvPr>
-        </p:nvSpPr>
-        <p:spPr/>
-        <p:txBody>
-          <a:bodyPr>
-            <a:normAutofit fontScale="90000"/>
-          </a:bodyPr>
-          <a:lstStyle/>
-          <a:p>
-            <a:r>
-              <a:rPr lang="en-AU" dirty="0" smtClean="0"/>
-              <a:t>Things to fix/change - </a:t>
-            </a:r>
-            <a:r>
-              <a:rPr lang="en-AU" dirty="0" err="1" smtClean="0"/>
-              <a:t>AminoAcylation</a:t>
-            </a:r>
-            <a:endParaRPr lang="en-AU" dirty="0"/>
-          </a:p>
-        </p:txBody>
-      </p:sp>
-      <p:sp>
-        <p:nvSpPr>
-          <p:cNvPr id="3" name="Content Placeholder 2"/>
-          <p:cNvSpPr>
-            <a:spLocks noGrp="1"/>
-          </p:cNvSpPr>
-          <p:nvPr>
-            <p:ph idx="1"/>
-          </p:nvPr>
-        </p:nvSpPr>
-        <p:spPr/>
-        <p:txBody>
-          <a:bodyPr>
-            <a:normAutofit/>
-          </a:bodyPr>
-          <a:lstStyle/>
-          <a:p>
-            <a:r>
-              <a:rPr lang="en-AU" dirty="0" err="1" smtClean="0"/>
-              <a:t>tRNA</a:t>
-            </a:r>
-            <a:r>
-              <a:rPr lang="en-AU" dirty="0" smtClean="0"/>
-              <a:t> </a:t>
-            </a:r>
-            <a:r>
-              <a:rPr lang="en-AU" dirty="0" err="1" smtClean="0"/>
-              <a:t>aminoacylation</a:t>
-            </a:r>
-            <a:r>
-              <a:rPr lang="en-AU" dirty="0" smtClean="0"/>
-              <a:t> performed as a single step catalysed by </a:t>
-            </a:r>
-            <a:r>
-              <a:rPr lang="en-AU" dirty="0" err="1" smtClean="0"/>
-              <a:t>AAx-tRNA</a:t>
-            </a:r>
-            <a:r>
-              <a:rPr lang="en-AU" dirty="0" smtClean="0"/>
-              <a:t> ligase</a:t>
-            </a:r>
-          </a:p>
-          <a:p>
-            <a:pPr lvl="1"/>
-            <a:r>
-              <a:rPr lang="en-AU" dirty="0" smtClean="0"/>
-              <a:t>Introduce intermediate steps</a:t>
-            </a:r>
-          </a:p>
-          <a:p>
-            <a:pPr marL="57150" indent="0">
-              <a:buNone/>
-            </a:pPr>
-            <a:endParaRPr lang="en-AU" dirty="0"/>
-          </a:p>
-          <a:p>
-            <a:pPr marL="57150" indent="0">
-              <a:buNone/>
-            </a:pPr>
-            <a:r>
-              <a:rPr lang="en-AU" sz="2800" dirty="0" err="1" smtClean="0"/>
-              <a:t>AAx</a:t>
-            </a:r>
-            <a:r>
-              <a:rPr lang="en-AU" sz="2800" dirty="0" smtClean="0"/>
-              <a:t> + </a:t>
-            </a:r>
-            <a:r>
-              <a:rPr lang="en-AU" sz="2800" dirty="0" err="1" smtClean="0"/>
-              <a:t>tRNA</a:t>
-            </a:r>
-            <a:r>
-              <a:rPr lang="en-AU" sz="2800" dirty="0" smtClean="0"/>
-              <a:t>(</a:t>
-            </a:r>
-            <a:r>
-              <a:rPr lang="en-AU" sz="2800" dirty="0" err="1" smtClean="0"/>
-              <a:t>AAx</a:t>
-            </a:r>
-            <a:r>
-              <a:rPr lang="en-AU" sz="2800" dirty="0" smtClean="0"/>
-              <a:t>) + ATP </a:t>
-            </a:r>
-            <a:r>
-              <a:rPr lang="en-AU" sz="2800" dirty="0" smtClean="0">
-                <a:sym typeface="Wingdings" panose="05000000000000000000" pitchFamily="2" charset="2"/>
-              </a:rPr>
-              <a:t> </a:t>
-            </a:r>
-            <a:r>
-              <a:rPr lang="en-AU" sz="2800" dirty="0" err="1" smtClean="0">
-                <a:sym typeface="Wingdings" panose="05000000000000000000" pitchFamily="2" charset="2"/>
-              </a:rPr>
-              <a:t>AAx-tRNA</a:t>
-            </a:r>
-            <a:r>
-              <a:rPr lang="en-AU" sz="2800" dirty="0" smtClean="0">
-                <a:sym typeface="Wingdings" panose="05000000000000000000" pitchFamily="2" charset="2"/>
-              </a:rPr>
-              <a:t>(</a:t>
-            </a:r>
-            <a:r>
-              <a:rPr lang="en-AU" sz="2800" dirty="0" err="1" smtClean="0">
-                <a:sym typeface="Wingdings" panose="05000000000000000000" pitchFamily="2" charset="2"/>
-              </a:rPr>
-              <a:t>AAx</a:t>
-            </a:r>
-            <a:r>
-              <a:rPr lang="en-AU" sz="2800" dirty="0" smtClean="0">
-                <a:sym typeface="Wingdings" panose="05000000000000000000" pitchFamily="2" charset="2"/>
-              </a:rPr>
-              <a:t>) + </a:t>
-            </a:r>
-            <a:r>
-              <a:rPr lang="en-AU" sz="2800" dirty="0" err="1" smtClean="0">
-                <a:sym typeface="Wingdings" panose="05000000000000000000" pitchFamily="2" charset="2"/>
-              </a:rPr>
-              <a:t>PPi</a:t>
-            </a:r>
-            <a:r>
-              <a:rPr lang="en-AU" sz="2800" dirty="0" smtClean="0">
-                <a:sym typeface="Wingdings" panose="05000000000000000000" pitchFamily="2" charset="2"/>
-              </a:rPr>
-              <a:t>  + AMP</a:t>
-            </a:r>
-          </a:p>
-          <a:p>
-            <a:pPr marL="57150" indent="0">
-              <a:buNone/>
-            </a:pPr>
-            <a:endParaRPr lang="en-AU" sz="2800" dirty="0">
-              <a:sym typeface="Wingdings" panose="05000000000000000000" pitchFamily="2" charset="2"/>
-            </a:endParaRPr>
-          </a:p>
-          <a:p>
-            <a:pPr marL="57150" indent="0">
-              <a:buNone/>
-            </a:pPr>
-            <a:r>
-              <a:rPr lang="en-AU" sz="2800" dirty="0" err="1" smtClean="0">
-                <a:sym typeface="Wingdings" panose="05000000000000000000" pitchFamily="2" charset="2"/>
-              </a:rPr>
-              <a:t>AAx</a:t>
-            </a:r>
-            <a:r>
-              <a:rPr lang="en-AU" sz="2800" dirty="0" smtClean="0">
-                <a:sym typeface="Wingdings" panose="05000000000000000000" pitchFamily="2" charset="2"/>
-              </a:rPr>
-              <a:t> + ATP  </a:t>
-            </a:r>
-            <a:r>
-              <a:rPr lang="en-AU" sz="2800" dirty="0" err="1" smtClean="0">
-                <a:sym typeface="Wingdings" panose="05000000000000000000" pitchFamily="2" charset="2"/>
-              </a:rPr>
-              <a:t>AAx</a:t>
-            </a:r>
-            <a:r>
-              <a:rPr lang="en-AU" sz="2800" dirty="0" smtClean="0">
-                <a:sym typeface="Wingdings" panose="05000000000000000000" pitchFamily="2" charset="2"/>
-              </a:rPr>
-              <a:t>-AMP + </a:t>
-            </a:r>
-            <a:r>
-              <a:rPr lang="en-AU" sz="2800" dirty="0" err="1" smtClean="0">
-                <a:sym typeface="Wingdings" panose="05000000000000000000" pitchFamily="2" charset="2"/>
-              </a:rPr>
-              <a:t>PPi</a:t>
-            </a:r>
-            <a:endParaRPr lang="en-AU" sz="2800" dirty="0" smtClean="0">
-              <a:sym typeface="Wingdings" panose="05000000000000000000" pitchFamily="2" charset="2"/>
-            </a:endParaRPr>
-          </a:p>
-          <a:p>
-            <a:pPr marL="57150" indent="0">
-              <a:buNone/>
-            </a:pPr>
-            <a:r>
-              <a:rPr lang="en-AU" sz="2800" dirty="0" err="1" smtClean="0">
-                <a:sym typeface="Wingdings" panose="05000000000000000000" pitchFamily="2" charset="2"/>
-              </a:rPr>
-              <a:t>AAx</a:t>
-            </a:r>
-            <a:r>
-              <a:rPr lang="en-AU" sz="2800" dirty="0" smtClean="0">
-                <a:sym typeface="Wingdings" panose="05000000000000000000" pitchFamily="2" charset="2"/>
-              </a:rPr>
-              <a:t>-AMP + </a:t>
-            </a:r>
-            <a:r>
-              <a:rPr lang="en-AU" sz="2800" dirty="0" err="1" smtClean="0">
-                <a:sym typeface="Wingdings" panose="05000000000000000000" pitchFamily="2" charset="2"/>
-              </a:rPr>
-              <a:t>tRNA</a:t>
-            </a:r>
-            <a:r>
-              <a:rPr lang="en-AU" sz="2800" dirty="0" smtClean="0">
-                <a:sym typeface="Wingdings" panose="05000000000000000000" pitchFamily="2" charset="2"/>
-              </a:rPr>
-              <a:t>(</a:t>
-            </a:r>
-            <a:r>
-              <a:rPr lang="en-AU" sz="2800" dirty="0" err="1" smtClean="0">
-                <a:sym typeface="Wingdings" panose="05000000000000000000" pitchFamily="2" charset="2"/>
-              </a:rPr>
-              <a:t>AAx</a:t>
-            </a:r>
-            <a:r>
-              <a:rPr lang="en-AU" sz="2800" dirty="0" smtClean="0">
-                <a:sym typeface="Wingdings" panose="05000000000000000000" pitchFamily="2" charset="2"/>
-              </a:rPr>
-              <a:t>)  AMP + </a:t>
-            </a:r>
-            <a:r>
-              <a:rPr lang="en-AU" sz="2800" dirty="0" err="1" smtClean="0">
-                <a:sym typeface="Wingdings" panose="05000000000000000000" pitchFamily="2" charset="2"/>
-              </a:rPr>
-              <a:t>AAx-tRNA</a:t>
-            </a:r>
-            <a:r>
-              <a:rPr lang="en-AU" sz="2800" dirty="0" smtClean="0">
-                <a:sym typeface="Wingdings" panose="05000000000000000000" pitchFamily="2" charset="2"/>
-              </a:rPr>
-              <a:t>(</a:t>
-            </a:r>
-            <a:r>
-              <a:rPr lang="en-AU" sz="2800" dirty="0" err="1" smtClean="0">
-                <a:sym typeface="Wingdings" panose="05000000000000000000" pitchFamily="2" charset="2"/>
-              </a:rPr>
-              <a:t>AAx</a:t>
-            </a:r>
-            <a:r>
-              <a:rPr lang="en-AU" sz="2800" dirty="0" smtClean="0">
-                <a:sym typeface="Wingdings" panose="05000000000000000000" pitchFamily="2" charset="2"/>
-              </a:rPr>
-              <a:t>)</a:t>
-            </a:r>
-            <a:endParaRPr lang="en-AU" sz="2800" dirty="0"/>
-          </a:p>
-        </p:txBody>
-      </p:sp>
-    </p:spTree>
-    <p:extLst>
-      <p:ext uri="{BB962C8B-B14F-4D97-AF65-F5344CB8AC3E}">
-        <p14:creationId xmlns:p14="http://schemas.microsoft.com/office/powerpoint/2010/main" val="368424594"/>
-      </p:ext>
-    </p:extLst>
-  </p:cSld>
-  <p:clrMapOvr>
-    <a:masterClrMapping/>
-  </p:clrMapOvr>
-</p:sld>
-</file>
-
-<file path=ppt/slides/slide8.xml><?xml version="1.0" encoding="utf-8"?>
 <p:sld xmlns:a="http://schemas.openxmlformats.org/drawingml/2006/main" xmlns:r="http://schemas.openxmlformats.org/officeDocument/2006/relationships" xmlns:p="http://schemas.openxmlformats.org/presentationml/2006/main">
   <p:cSld>
     <p:spTree>
@@ -4736,6 +3470,1405 @@
   <p:clrMapOvr>
     <a:masterClrMapping/>
   </p:clrMapOvr>
+  <p:timing>
+    <p:tnLst>
+      <p:par>
+        <p:cTn id="1" dur="indefinite" restart="never" nodeType="tmRoot"/>
+      </p:par>
+    </p:tnLst>
+  </p:timing>
+</p:sld>
+</file>
+
+<file path=ppt/slides/slide11.xml><?xml version="1.0" encoding="utf-8"?>
+<p:sld xmlns:a="http://schemas.openxmlformats.org/drawingml/2006/main" xmlns:r="http://schemas.openxmlformats.org/officeDocument/2006/relationships" xmlns:p="http://schemas.openxmlformats.org/presentationml/2006/main">
+  <p:cSld>
+    <p:spTree>
+      <p:nvGrpSpPr>
+        <p:cNvPr id="1" name=""/>
+        <p:cNvGrpSpPr/>
+        <p:nvPr/>
+      </p:nvGrpSpPr>
+      <p:grpSpPr>
+        <a:xfrm>
+          <a:off x="0" y="0"/>
+          <a:ext cx="0" cy="0"/>
+          <a:chOff x="0" y="0"/>
+          <a:chExt cx="0" cy="0"/>
+        </a:xfrm>
+      </p:grpSpPr>
+      <p:sp>
+        <p:nvSpPr>
+          <p:cNvPr id="2" name="Title 1"/>
+          <p:cNvSpPr>
+            <a:spLocks noGrp="1"/>
+          </p:cNvSpPr>
+          <p:nvPr>
+            <p:ph type="title"/>
+          </p:nvPr>
+        </p:nvSpPr>
+        <p:spPr/>
+        <p:txBody>
+          <a:bodyPr/>
+          <a:lstStyle/>
+          <a:p>
+            <a:r>
+              <a:rPr lang="en-AU" dirty="0" smtClean="0"/>
+              <a:t>Things to fix/change - Translation</a:t>
+            </a:r>
+            <a:endParaRPr lang="en-AU" dirty="0"/>
+          </a:p>
+        </p:txBody>
+      </p:sp>
+      <p:sp>
+        <p:nvSpPr>
+          <p:cNvPr id="3" name="Content Placeholder 2"/>
+          <p:cNvSpPr>
+            <a:spLocks noGrp="1"/>
+          </p:cNvSpPr>
+          <p:nvPr>
+            <p:ph idx="1"/>
+          </p:nvPr>
+        </p:nvSpPr>
+        <p:spPr>
+          <a:xfrm>
+            <a:off x="457200" y="1600200"/>
+            <a:ext cx="8229600" cy="4925144"/>
+          </a:xfrm>
+        </p:spPr>
+        <p:txBody>
+          <a:bodyPr>
+            <a:normAutofit fontScale="92500" lnSpcReduction="10000"/>
+          </a:bodyPr>
+          <a:lstStyle/>
+          <a:p>
+            <a:r>
+              <a:rPr lang="en-AU" dirty="0" smtClean="0"/>
+              <a:t>Antibiotic effects: drive ribosome disassembly/block </a:t>
+            </a:r>
+            <a:r>
+              <a:rPr lang="en-AU" dirty="0" err="1" smtClean="0"/>
+              <a:t>ribsome</a:t>
+            </a:r>
+            <a:r>
+              <a:rPr lang="en-AU" dirty="0" smtClean="0"/>
+              <a:t> assembly?</a:t>
+            </a:r>
+          </a:p>
+          <a:p>
+            <a:pPr lvl="1"/>
+            <a:r>
+              <a:rPr lang="en-AU" dirty="0" smtClean="0"/>
+              <a:t>Currently in protein activation submodule</a:t>
+            </a:r>
+          </a:p>
+          <a:p>
+            <a:endParaRPr lang="en-AU" dirty="0"/>
+          </a:p>
+          <a:p>
+            <a:r>
+              <a:rPr lang="en-AU" dirty="0" smtClean="0"/>
+              <a:t>Translation reactions should be built from mRNA sequence (rather than protein sequence) to allow for mutations</a:t>
+            </a:r>
+          </a:p>
+          <a:p>
+            <a:endParaRPr lang="en-AU" dirty="0"/>
+          </a:p>
+          <a:p>
+            <a:r>
+              <a:rPr lang="en-AU" dirty="0" smtClean="0"/>
+              <a:t>EF-P: catalyses attachment of </a:t>
+            </a:r>
+            <a:r>
+              <a:rPr lang="en-AU" dirty="0" err="1" smtClean="0"/>
+              <a:t>fMET</a:t>
+            </a:r>
+            <a:r>
+              <a:rPr lang="en-AU" dirty="0" smtClean="0"/>
+              <a:t> to 2</a:t>
+            </a:r>
+            <a:r>
+              <a:rPr lang="en-AU" baseline="30000" dirty="0" smtClean="0"/>
+              <a:t>nd</a:t>
+            </a:r>
+            <a:r>
+              <a:rPr lang="en-AU" dirty="0" smtClean="0"/>
+              <a:t> amino acid</a:t>
+            </a:r>
+            <a:endParaRPr lang="en-AU" dirty="0"/>
+          </a:p>
+        </p:txBody>
+      </p:sp>
+    </p:spTree>
+    <p:extLst>
+      <p:ext uri="{BB962C8B-B14F-4D97-AF65-F5344CB8AC3E}">
+        <p14:creationId xmlns:p14="http://schemas.microsoft.com/office/powerpoint/2010/main" val="3498815092"/>
+      </p:ext>
+    </p:extLst>
+  </p:cSld>
+  <p:clrMapOvr>
+    <a:masterClrMapping/>
+  </p:clrMapOvr>
+  <p:timing>
+    <p:tnLst>
+      <p:par>
+        <p:cTn id="1" dur="indefinite" restart="never" nodeType="tmRoot"/>
+      </p:par>
+    </p:tnLst>
+  </p:timing>
+</p:sld>
+</file>
+
+<file path=ppt/slides/slide12.xml><?xml version="1.0" encoding="utf-8"?>
+<p:sld xmlns:a="http://schemas.openxmlformats.org/drawingml/2006/main" xmlns:r="http://schemas.openxmlformats.org/officeDocument/2006/relationships" xmlns:p="http://schemas.openxmlformats.org/presentationml/2006/main">
+  <p:cSld>
+    <p:spTree>
+      <p:nvGrpSpPr>
+        <p:cNvPr id="1" name=""/>
+        <p:cNvGrpSpPr/>
+        <p:nvPr/>
+      </p:nvGrpSpPr>
+      <p:grpSpPr>
+        <a:xfrm>
+          <a:off x="0" y="0"/>
+          <a:ext cx="0" cy="0"/>
+          <a:chOff x="0" y="0"/>
+          <a:chExt cx="0" cy="0"/>
+        </a:xfrm>
+      </p:grpSpPr>
+      <p:sp>
+        <p:nvSpPr>
+          <p:cNvPr id="2" name="Title 1"/>
+          <p:cNvSpPr>
+            <a:spLocks noGrp="1"/>
+          </p:cNvSpPr>
+          <p:nvPr>
+            <p:ph type="title"/>
+          </p:nvPr>
+        </p:nvSpPr>
+        <p:spPr/>
+        <p:txBody>
+          <a:bodyPr/>
+          <a:lstStyle/>
+          <a:p>
+            <a:r>
+              <a:rPr lang="en-AU" dirty="0" smtClean="0"/>
+              <a:t>Things to fix/change - Translation</a:t>
+            </a:r>
+            <a:endParaRPr lang="en-AU" dirty="0"/>
+          </a:p>
+        </p:txBody>
+      </p:sp>
+      <p:sp>
+        <p:nvSpPr>
+          <p:cNvPr id="3" name="Content Placeholder 2"/>
+          <p:cNvSpPr>
+            <a:spLocks noGrp="1"/>
+          </p:cNvSpPr>
+          <p:nvPr>
+            <p:ph idx="1"/>
+          </p:nvPr>
+        </p:nvSpPr>
+        <p:spPr>
+          <a:xfrm>
+            <a:off x="457200" y="1600200"/>
+            <a:ext cx="8229600" cy="4925144"/>
+          </a:xfrm>
+        </p:spPr>
+        <p:txBody>
+          <a:bodyPr>
+            <a:normAutofit fontScale="85000" lnSpcReduction="10000"/>
+          </a:bodyPr>
+          <a:lstStyle/>
+          <a:p>
+            <a:r>
+              <a:rPr lang="en-AU" dirty="0" smtClean="0"/>
+              <a:t>Limit maximum extension within a single model iteration</a:t>
+            </a:r>
+          </a:p>
+          <a:p>
+            <a:pPr lvl="1"/>
+            <a:r>
+              <a:rPr lang="en-AU" dirty="0" smtClean="0"/>
+              <a:t>Unlikely, but possible with Gillespie algorithm that a single amino acid + ribosome extends more than possible</a:t>
+            </a:r>
+          </a:p>
+          <a:p>
+            <a:pPr lvl="1"/>
+            <a:r>
+              <a:rPr lang="en-AU" dirty="0" smtClean="0"/>
+              <a:t>Could maybe reduce number of reactions (e.g. add blocks of amino acids), or single reaction with slower reaction</a:t>
+            </a:r>
+          </a:p>
+          <a:p>
+            <a:endParaRPr lang="en-AU" dirty="0"/>
+          </a:p>
+          <a:p>
+            <a:r>
+              <a:rPr lang="en-AU" dirty="0" smtClean="0"/>
+              <a:t>Define module requirements for integration</a:t>
+            </a:r>
+          </a:p>
+          <a:p>
+            <a:pPr lvl="1"/>
+            <a:r>
+              <a:rPr lang="en-AU" dirty="0" smtClean="0"/>
+              <a:t>Jonathan’s talk:</a:t>
+            </a:r>
+          </a:p>
+          <a:p>
+            <a:pPr lvl="2"/>
+            <a:r>
+              <a:rPr lang="en-AU" dirty="0" smtClean="0"/>
+              <a:t>Translation: 29% of ATP</a:t>
+            </a:r>
+          </a:p>
+          <a:p>
+            <a:pPr lvl="2"/>
+            <a:r>
+              <a:rPr lang="en-AU" dirty="0" err="1" smtClean="0"/>
+              <a:t>tRNA</a:t>
+            </a:r>
+            <a:r>
+              <a:rPr lang="en-AU" dirty="0" smtClean="0"/>
+              <a:t> </a:t>
+            </a:r>
+            <a:r>
+              <a:rPr lang="en-AU" dirty="0" err="1" smtClean="0"/>
+              <a:t>aminoacylation</a:t>
+            </a:r>
+            <a:r>
+              <a:rPr lang="en-AU" dirty="0" smtClean="0"/>
+              <a:t>: 15.1% of ATP</a:t>
+            </a:r>
+          </a:p>
+          <a:p>
+            <a:pPr lvl="2"/>
+            <a:r>
+              <a:rPr lang="en-AU" dirty="0" smtClean="0"/>
+              <a:t>Unknown: ~40%(?) of ATP</a:t>
+            </a:r>
+            <a:endParaRPr lang="en-AU" dirty="0"/>
+          </a:p>
+        </p:txBody>
+      </p:sp>
+    </p:spTree>
+    <p:extLst>
+      <p:ext uri="{BB962C8B-B14F-4D97-AF65-F5344CB8AC3E}">
+        <p14:creationId xmlns:p14="http://schemas.microsoft.com/office/powerpoint/2010/main" val="1456272442"/>
+      </p:ext>
+    </p:extLst>
+  </p:cSld>
+  <p:clrMapOvr>
+    <a:masterClrMapping/>
+  </p:clrMapOvr>
+  <p:timing>
+    <p:tnLst>
+      <p:par>
+        <p:cTn id="1" dur="indefinite" restart="never" nodeType="tmRoot"/>
+      </p:par>
+    </p:tnLst>
+  </p:timing>
+</p:sld>
+</file>
+
+<file path=ppt/slides/slide13.xml><?xml version="1.0" encoding="utf-8"?>
+<p:sld xmlns:a="http://schemas.openxmlformats.org/drawingml/2006/main" xmlns:r="http://schemas.openxmlformats.org/officeDocument/2006/relationships" xmlns:p="http://schemas.openxmlformats.org/presentationml/2006/main">
+  <p:cSld>
+    <p:spTree>
+      <p:nvGrpSpPr>
+        <p:cNvPr id="1" name=""/>
+        <p:cNvGrpSpPr/>
+        <p:nvPr/>
+      </p:nvGrpSpPr>
+      <p:grpSpPr>
+        <a:xfrm>
+          <a:off x="0" y="0"/>
+          <a:ext cx="0" cy="0"/>
+          <a:chOff x="0" y="0"/>
+          <a:chExt cx="0" cy="0"/>
+        </a:xfrm>
+      </p:grpSpPr>
+      <p:sp>
+        <p:nvSpPr>
+          <p:cNvPr id="2" name="Title 1"/>
+          <p:cNvSpPr>
+            <a:spLocks noGrp="1"/>
+          </p:cNvSpPr>
+          <p:nvPr>
+            <p:ph type="title"/>
+          </p:nvPr>
+        </p:nvSpPr>
+        <p:spPr/>
+        <p:txBody>
+          <a:bodyPr/>
+          <a:lstStyle/>
+          <a:p>
+            <a:r>
+              <a:rPr lang="en-AU" dirty="0" smtClean="0"/>
+              <a:t>Things to fix/change</a:t>
+            </a:r>
+            <a:endParaRPr lang="en-AU" dirty="0"/>
+          </a:p>
+        </p:txBody>
+      </p:sp>
+      <p:sp>
+        <p:nvSpPr>
+          <p:cNvPr id="3" name="Content Placeholder 2"/>
+          <p:cNvSpPr>
+            <a:spLocks noGrp="1"/>
+          </p:cNvSpPr>
+          <p:nvPr>
+            <p:ph idx="1"/>
+          </p:nvPr>
+        </p:nvSpPr>
+        <p:spPr>
+          <a:xfrm>
+            <a:off x="457200" y="1600200"/>
+            <a:ext cx="8229600" cy="4853136"/>
+          </a:xfrm>
+        </p:spPr>
+        <p:txBody>
+          <a:bodyPr>
+            <a:normAutofit lnSpcReduction="10000"/>
+          </a:bodyPr>
+          <a:lstStyle/>
+          <a:p>
+            <a:r>
+              <a:rPr lang="en-AU" dirty="0" smtClean="0"/>
+              <a:t>Combine/integrate </a:t>
+            </a:r>
+            <a:r>
+              <a:rPr lang="en-AU" dirty="0" err="1" smtClean="0"/>
+              <a:t>tRNA</a:t>
+            </a:r>
+            <a:r>
+              <a:rPr lang="en-AU" dirty="0" smtClean="0"/>
+              <a:t> </a:t>
+            </a:r>
+            <a:r>
+              <a:rPr lang="en-AU" dirty="0" err="1" smtClean="0"/>
+              <a:t>aminoacylation</a:t>
+            </a:r>
+            <a:r>
+              <a:rPr lang="en-AU" dirty="0" smtClean="0"/>
+              <a:t> and translation into a single SBML model?</a:t>
+            </a:r>
+          </a:p>
+          <a:p>
+            <a:endParaRPr lang="en-AU" dirty="0"/>
+          </a:p>
+          <a:p>
+            <a:endParaRPr lang="en-AU" dirty="0" smtClean="0"/>
+          </a:p>
+          <a:p>
+            <a:endParaRPr lang="en-AU" dirty="0"/>
+          </a:p>
+          <a:p>
+            <a:endParaRPr lang="en-AU" dirty="0" smtClean="0"/>
+          </a:p>
+          <a:p>
+            <a:endParaRPr lang="en-AU" dirty="0"/>
+          </a:p>
+          <a:p>
+            <a:r>
+              <a:rPr lang="en-AU" dirty="0" smtClean="0"/>
+              <a:t>Annotation and further documentation</a:t>
+            </a:r>
+          </a:p>
+          <a:p>
+            <a:r>
+              <a:rPr lang="en-AU" dirty="0" smtClean="0"/>
+              <a:t>SED-ML representation?</a:t>
+            </a:r>
+          </a:p>
+          <a:p>
+            <a:pPr marL="0" indent="0">
+              <a:buNone/>
+            </a:pPr>
+            <a:endParaRPr lang="en-AU" dirty="0" smtClean="0"/>
+          </a:p>
+        </p:txBody>
+      </p:sp>
+      <p:pic>
+        <p:nvPicPr>
+          <p:cNvPr id="1027" name="Picture 3"/>
+          <p:cNvPicPr>
+            <a:picLocks noChangeAspect="1" noChangeArrowheads="1"/>
+          </p:cNvPicPr>
+          <p:nvPr/>
+        </p:nvPicPr>
+        <p:blipFill>
+          <a:blip r:embed="rId2">
+            <a:extLst>
+              <a:ext uri="{28A0092B-C50C-407E-A947-70E740481C1C}">
+                <a14:useLocalDpi xmlns:a14="http://schemas.microsoft.com/office/drawing/2010/main" val="0"/>
+              </a:ext>
+            </a:extLst>
+          </a:blip>
+          <a:srcRect/>
+          <a:stretch>
+            <a:fillRect/>
+          </a:stretch>
+        </p:blipFill>
+        <p:spPr bwMode="auto">
+          <a:xfrm>
+            <a:off x="251520" y="2636912"/>
+            <a:ext cx="8755902" cy="2520280"/>
+          </a:xfrm>
+          <a:prstGeom prst="rect">
+            <a:avLst/>
+          </a:prstGeom>
+          <a:noFill/>
+          <a:ln>
+            <a:noFill/>
+          </a:ln>
+          <a:extLst>
+            <a:ext uri="{909E8E84-426E-40DD-AFC4-6F175D3DCCD1}">
+              <a14:hiddenFill xmlns:a14="http://schemas.microsoft.com/office/drawing/2010/main">
+                <a:solidFill>
+                  <a:schemeClr val="accent1"/>
+                </a:solidFill>
+              </a14:hiddenFill>
+            </a:ext>
+            <a:ext uri="{91240B29-F687-4F45-9708-019B960494DF}">
+              <a14:hiddenLine xmlns:a14="http://schemas.microsoft.com/office/drawing/2010/main" w="9525">
+                <a:solidFill>
+                  <a:schemeClr val="tx1"/>
+                </a:solidFill>
+                <a:miter lim="800000"/>
+                <a:headEnd/>
+                <a:tailEnd/>
+              </a14:hiddenLine>
+            </a:ext>
+          </a:extLst>
+        </p:spPr>
+      </p:pic>
+    </p:spTree>
+    <p:extLst>
+      <p:ext uri="{BB962C8B-B14F-4D97-AF65-F5344CB8AC3E}">
+        <p14:creationId xmlns:p14="http://schemas.microsoft.com/office/powerpoint/2010/main" val="3314973919"/>
+      </p:ext>
+    </p:extLst>
+  </p:cSld>
+  <p:clrMapOvr>
+    <a:masterClrMapping/>
+  </p:clrMapOvr>
+  <p:timing>
+    <p:tnLst>
+      <p:par>
+        <p:cTn id="1" dur="indefinite" restart="never" nodeType="tmRoot"/>
+      </p:par>
+    </p:tnLst>
+  </p:timing>
+</p:sld>
+</file>
+
+<file path=ppt/slides/slide2.xml><?xml version="1.0" encoding="utf-8"?>
+<p:sld xmlns:a="http://schemas.openxmlformats.org/drawingml/2006/main" xmlns:r="http://schemas.openxmlformats.org/officeDocument/2006/relationships" xmlns:p="http://schemas.openxmlformats.org/presentationml/2006/main">
+  <p:cSld>
+    <p:spTree>
+      <p:nvGrpSpPr>
+        <p:cNvPr id="1" name=""/>
+        <p:cNvGrpSpPr/>
+        <p:nvPr/>
+      </p:nvGrpSpPr>
+      <p:grpSpPr>
+        <a:xfrm>
+          <a:off x="0" y="0"/>
+          <a:ext cx="0" cy="0"/>
+          <a:chOff x="0" y="0"/>
+          <a:chExt cx="0" cy="0"/>
+        </a:xfrm>
+      </p:grpSpPr>
+      <p:sp>
+        <p:nvSpPr>
+          <p:cNvPr id="2" name="Title 1"/>
+          <p:cNvSpPr>
+            <a:spLocks noGrp="1"/>
+          </p:cNvSpPr>
+          <p:nvPr>
+            <p:ph type="title"/>
+          </p:nvPr>
+        </p:nvSpPr>
+        <p:spPr/>
+        <p:txBody>
+          <a:bodyPr/>
+          <a:lstStyle/>
+          <a:p>
+            <a:r>
+              <a:rPr lang="en-AU" dirty="0" smtClean="0"/>
+              <a:t>Tools Used</a:t>
+            </a:r>
+            <a:endParaRPr lang="en-AU" dirty="0"/>
+          </a:p>
+        </p:txBody>
+      </p:sp>
+      <p:sp>
+        <p:nvSpPr>
+          <p:cNvPr id="3" name="Content Placeholder 2"/>
+          <p:cNvSpPr>
+            <a:spLocks noGrp="1"/>
+          </p:cNvSpPr>
+          <p:nvPr>
+            <p:ph idx="1"/>
+          </p:nvPr>
+        </p:nvSpPr>
+        <p:spPr/>
+        <p:txBody>
+          <a:bodyPr/>
+          <a:lstStyle/>
+          <a:p>
+            <a:r>
+              <a:rPr lang="en-AU" dirty="0" smtClean="0"/>
+              <a:t>VANTED</a:t>
+            </a:r>
+          </a:p>
+          <a:p>
+            <a:r>
+              <a:rPr lang="en-AU" dirty="0" smtClean="0"/>
+              <a:t>python + </a:t>
+            </a:r>
+            <a:r>
+              <a:rPr lang="en-AU" dirty="0" err="1" smtClean="0"/>
+              <a:t>libSBML</a:t>
+            </a:r>
+            <a:endParaRPr lang="en-AU" dirty="0" smtClean="0"/>
+          </a:p>
+          <a:p>
+            <a:r>
+              <a:rPr lang="en-AU" dirty="0" smtClean="0"/>
+              <a:t>COPASI</a:t>
+            </a:r>
+            <a:endParaRPr lang="en-AU" dirty="0"/>
+          </a:p>
+        </p:txBody>
+      </p:sp>
+    </p:spTree>
+    <p:extLst>
+      <p:ext uri="{BB962C8B-B14F-4D97-AF65-F5344CB8AC3E}">
+        <p14:creationId xmlns:p14="http://schemas.microsoft.com/office/powerpoint/2010/main" val="2789110177"/>
+      </p:ext>
+    </p:extLst>
+  </p:cSld>
+  <p:clrMapOvr>
+    <a:masterClrMapping/>
+  </p:clrMapOvr>
+  <p:timing>
+    <p:tnLst>
+      <p:par>
+        <p:cTn id="1" dur="indefinite" restart="never" nodeType="tmRoot"/>
+      </p:par>
+    </p:tnLst>
+  </p:timing>
+</p:sld>
+</file>
+
+<file path=ppt/slides/slide3.xml><?xml version="1.0" encoding="utf-8"?>
+<p:sld xmlns:a="http://schemas.openxmlformats.org/drawingml/2006/main" xmlns:r="http://schemas.openxmlformats.org/officeDocument/2006/relationships" xmlns:p="http://schemas.openxmlformats.org/presentationml/2006/main">
+  <p:cSld>
+    <p:spTree>
+      <p:nvGrpSpPr>
+        <p:cNvPr id="1" name=""/>
+        <p:cNvGrpSpPr/>
+        <p:nvPr/>
+      </p:nvGrpSpPr>
+      <p:grpSpPr>
+        <a:xfrm>
+          <a:off x="0" y="0"/>
+          <a:ext cx="0" cy="0"/>
+          <a:chOff x="0" y="0"/>
+          <a:chExt cx="0" cy="0"/>
+        </a:xfrm>
+      </p:grpSpPr>
+      <p:sp>
+        <p:nvSpPr>
+          <p:cNvPr id="2" name="Title 1"/>
+          <p:cNvSpPr>
+            <a:spLocks noGrp="1"/>
+          </p:cNvSpPr>
+          <p:nvPr>
+            <p:ph type="title"/>
+          </p:nvPr>
+        </p:nvSpPr>
+        <p:spPr/>
+        <p:txBody>
+          <a:bodyPr>
+            <a:normAutofit fontScale="90000"/>
+          </a:bodyPr>
+          <a:lstStyle/>
+          <a:p>
+            <a:r>
+              <a:rPr lang="en-AU" dirty="0" smtClean="0"/>
+              <a:t>Current implementation – </a:t>
+            </a:r>
+            <a:r>
+              <a:rPr lang="en-AU" dirty="0" err="1" smtClean="0"/>
+              <a:t>tRNA</a:t>
+            </a:r>
+            <a:r>
+              <a:rPr lang="en-AU" dirty="0" smtClean="0"/>
+              <a:t> </a:t>
+            </a:r>
+            <a:r>
+              <a:rPr lang="en-AU" dirty="0" err="1" smtClean="0"/>
+              <a:t>aminoacylation</a:t>
+            </a:r>
+            <a:endParaRPr lang="en-AU" dirty="0"/>
+          </a:p>
+        </p:txBody>
+      </p:sp>
+      <p:sp>
+        <p:nvSpPr>
+          <p:cNvPr id="3" name="Content Placeholder 2"/>
+          <p:cNvSpPr>
+            <a:spLocks noGrp="1"/>
+          </p:cNvSpPr>
+          <p:nvPr>
+            <p:ph idx="1"/>
+          </p:nvPr>
+        </p:nvSpPr>
+        <p:spPr/>
+        <p:txBody>
+          <a:bodyPr/>
+          <a:lstStyle/>
+          <a:p>
+            <a:r>
+              <a:rPr lang="en-AU" dirty="0" smtClean="0"/>
+              <a:t>As specified by Jonathan (30 odd reactions)</a:t>
+            </a:r>
+          </a:p>
+        </p:txBody>
+      </p:sp>
+      <p:pic>
+        <p:nvPicPr>
+          <p:cNvPr id="1026" name="Picture 2" descr="C:\wc\2014_VW_modelling_workshop\wholecell-translation\sbgn\aminoacylation.graphml.png"/>
+          <p:cNvPicPr>
+            <a:picLocks noChangeAspect="1" noChangeArrowheads="1"/>
+          </p:cNvPicPr>
+          <p:nvPr/>
+        </p:nvPicPr>
+        <p:blipFill rotWithShape="1">
+          <a:blip r:embed="rId2" cstate="print">
+            <a:extLst>
+              <a:ext uri="{28A0092B-C50C-407E-A947-70E740481C1C}">
+                <a14:useLocalDpi xmlns:a14="http://schemas.microsoft.com/office/drawing/2010/main" val="0"/>
+              </a:ext>
+            </a:extLst>
+          </a:blip>
+          <a:srcRect r="27334"/>
+          <a:stretch/>
+        </p:blipFill>
+        <p:spPr bwMode="auto">
+          <a:xfrm>
+            <a:off x="1979712" y="2276872"/>
+            <a:ext cx="4896544" cy="4402233"/>
+          </a:xfrm>
+          <a:prstGeom prst="rect">
+            <a:avLst/>
+          </a:prstGeom>
+          <a:noFill/>
+          <a:extLst>
+            <a:ext uri="{909E8E84-426E-40DD-AFC4-6F175D3DCCD1}">
+              <a14:hiddenFill xmlns:a14="http://schemas.microsoft.com/office/drawing/2010/main">
+                <a:solidFill>
+                  <a:srgbClr val="FFFFFF"/>
+                </a:solidFill>
+              </a14:hiddenFill>
+            </a:ext>
+          </a:extLst>
+        </p:spPr>
+      </p:pic>
+    </p:spTree>
+    <p:extLst>
+      <p:ext uri="{BB962C8B-B14F-4D97-AF65-F5344CB8AC3E}">
+        <p14:creationId xmlns:p14="http://schemas.microsoft.com/office/powerpoint/2010/main" val="2792140726"/>
+      </p:ext>
+    </p:extLst>
+  </p:cSld>
+  <p:clrMapOvr>
+    <a:masterClrMapping/>
+  </p:clrMapOvr>
+  <p:timing>
+    <p:tnLst>
+      <p:par>
+        <p:cTn id="1" dur="indefinite" restart="never" nodeType="tmRoot"/>
+      </p:par>
+    </p:tnLst>
+  </p:timing>
+</p:sld>
+</file>
+
+<file path=ppt/slides/slide4.xml><?xml version="1.0" encoding="utf-8"?>
+<p:sld xmlns:a="http://schemas.openxmlformats.org/drawingml/2006/main" xmlns:r="http://schemas.openxmlformats.org/officeDocument/2006/relationships" xmlns:p="http://schemas.openxmlformats.org/presentationml/2006/main">
+  <p:cSld>
+    <p:spTree>
+      <p:nvGrpSpPr>
+        <p:cNvPr id="1" name=""/>
+        <p:cNvGrpSpPr/>
+        <p:nvPr/>
+      </p:nvGrpSpPr>
+      <p:grpSpPr>
+        <a:xfrm>
+          <a:off x="0" y="0"/>
+          <a:ext cx="0" cy="0"/>
+          <a:chOff x="0" y="0"/>
+          <a:chExt cx="0" cy="0"/>
+        </a:xfrm>
+      </p:grpSpPr>
+      <p:sp>
+        <p:nvSpPr>
+          <p:cNvPr id="2" name="Title 1"/>
+          <p:cNvSpPr>
+            <a:spLocks noGrp="1"/>
+          </p:cNvSpPr>
+          <p:nvPr>
+            <p:ph type="title"/>
+          </p:nvPr>
+        </p:nvSpPr>
+        <p:spPr/>
+        <p:txBody>
+          <a:bodyPr>
+            <a:normAutofit fontScale="90000"/>
+          </a:bodyPr>
+          <a:lstStyle/>
+          <a:p>
+            <a:r>
+              <a:rPr lang="en-AU" dirty="0" smtClean="0"/>
+              <a:t>Current implementation – </a:t>
+            </a:r>
+            <a:r>
+              <a:rPr lang="en-AU" dirty="0" err="1" smtClean="0"/>
+              <a:t>tRNA</a:t>
+            </a:r>
+            <a:r>
+              <a:rPr lang="en-AU" dirty="0" smtClean="0"/>
+              <a:t> </a:t>
+            </a:r>
+            <a:r>
+              <a:rPr lang="en-AU" dirty="0" err="1" smtClean="0"/>
+              <a:t>aminoacylation</a:t>
+            </a:r>
+            <a:endParaRPr lang="en-AU" dirty="0"/>
+          </a:p>
+        </p:txBody>
+      </p:sp>
+      <p:sp>
+        <p:nvSpPr>
+          <p:cNvPr id="3" name="Content Placeholder 2"/>
+          <p:cNvSpPr>
+            <a:spLocks noGrp="1"/>
+          </p:cNvSpPr>
+          <p:nvPr>
+            <p:ph idx="1"/>
+          </p:nvPr>
+        </p:nvSpPr>
+        <p:spPr/>
+        <p:txBody>
+          <a:bodyPr/>
+          <a:lstStyle/>
+          <a:p>
+            <a:r>
+              <a:rPr lang="en-AU" dirty="0" smtClean="0"/>
+              <a:t>SBML model opens/runs in COPASI</a:t>
+            </a:r>
+          </a:p>
+          <a:p>
+            <a:pPr lvl="1"/>
+            <a:r>
+              <a:rPr lang="en-AU" dirty="0" smtClean="0"/>
+              <a:t>Very rapid (instant?) processes? Conversion of MET_MG488 to fMET_488</a:t>
+            </a:r>
+          </a:p>
+          <a:p>
+            <a:endParaRPr lang="en-AU" dirty="0"/>
+          </a:p>
+        </p:txBody>
+      </p:sp>
+      <p:pic>
+        <p:nvPicPr>
+          <p:cNvPr id="2051" name="Picture 3"/>
+          <p:cNvPicPr>
+            <a:picLocks noChangeAspect="1" noChangeArrowheads="1"/>
+          </p:cNvPicPr>
+          <p:nvPr/>
+        </p:nvPicPr>
+        <p:blipFill rotWithShape="1">
+          <a:blip r:embed="rId2">
+            <a:extLst>
+              <a:ext uri="{28A0092B-C50C-407E-A947-70E740481C1C}">
+                <a14:useLocalDpi xmlns:a14="http://schemas.microsoft.com/office/drawing/2010/main" val="0"/>
+              </a:ext>
+            </a:extLst>
+          </a:blip>
+          <a:srcRect l="26574" t="25852" r="26574" b="17329"/>
+          <a:stretch/>
+        </p:blipFill>
+        <p:spPr bwMode="auto">
+          <a:xfrm>
+            <a:off x="2051720" y="3135269"/>
+            <a:ext cx="5184575" cy="3534938"/>
+          </a:xfrm>
+          <a:prstGeom prst="rect">
+            <a:avLst/>
+          </a:prstGeom>
+          <a:noFill/>
+          <a:ln>
+            <a:noFill/>
+          </a:ln>
+          <a:extLst>
+            <a:ext uri="{909E8E84-426E-40DD-AFC4-6F175D3DCCD1}">
+              <a14:hiddenFill xmlns:a14="http://schemas.microsoft.com/office/drawing/2010/main">
+                <a:solidFill>
+                  <a:schemeClr val="accent1"/>
+                </a:solidFill>
+              </a14:hiddenFill>
+            </a:ext>
+            <a:ext uri="{91240B29-F687-4F45-9708-019B960494DF}">
+              <a14:hiddenLine xmlns:a14="http://schemas.microsoft.com/office/drawing/2010/main" w="9525">
+                <a:solidFill>
+                  <a:schemeClr val="tx1"/>
+                </a:solidFill>
+                <a:miter lim="800000"/>
+                <a:headEnd/>
+                <a:tailEnd/>
+              </a14:hiddenLine>
+            </a:ext>
+          </a:extLst>
+        </p:spPr>
+      </p:pic>
+    </p:spTree>
+    <p:extLst>
+      <p:ext uri="{BB962C8B-B14F-4D97-AF65-F5344CB8AC3E}">
+        <p14:creationId xmlns:p14="http://schemas.microsoft.com/office/powerpoint/2010/main" val="3606207520"/>
+      </p:ext>
+    </p:extLst>
+  </p:cSld>
+  <p:clrMapOvr>
+    <a:masterClrMapping/>
+  </p:clrMapOvr>
+  <p:timing>
+    <p:tnLst>
+      <p:par>
+        <p:cTn id="1" dur="indefinite" restart="never" nodeType="tmRoot"/>
+      </p:par>
+    </p:tnLst>
+  </p:timing>
+</p:sld>
+</file>
+
+<file path=ppt/slides/slide5.xml><?xml version="1.0" encoding="utf-8"?>
+<p:sld xmlns:a="http://schemas.openxmlformats.org/drawingml/2006/main" xmlns:r="http://schemas.openxmlformats.org/officeDocument/2006/relationships" xmlns:p="http://schemas.openxmlformats.org/presentationml/2006/main">
+  <p:cSld>
+    <p:spTree>
+      <p:nvGrpSpPr>
+        <p:cNvPr id="1" name=""/>
+        <p:cNvGrpSpPr/>
+        <p:nvPr/>
+      </p:nvGrpSpPr>
+      <p:grpSpPr>
+        <a:xfrm>
+          <a:off x="0" y="0"/>
+          <a:ext cx="0" cy="0"/>
+          <a:chOff x="0" y="0"/>
+          <a:chExt cx="0" cy="0"/>
+        </a:xfrm>
+      </p:grpSpPr>
+      <p:sp>
+        <p:nvSpPr>
+          <p:cNvPr id="2" name="Title 1"/>
+          <p:cNvSpPr>
+            <a:spLocks noGrp="1"/>
+          </p:cNvSpPr>
+          <p:nvPr>
+            <p:ph type="title"/>
+          </p:nvPr>
+        </p:nvSpPr>
+        <p:spPr/>
+        <p:txBody>
+          <a:bodyPr/>
+          <a:lstStyle/>
+          <a:p>
+            <a:r>
+              <a:rPr lang="en-AU" dirty="0" smtClean="0"/>
+              <a:t>Jonathan’s Implementation</a:t>
+            </a:r>
+            <a:endParaRPr lang="en-AU" dirty="0"/>
+          </a:p>
+        </p:txBody>
+      </p:sp>
+      <p:pic>
+        <p:nvPicPr>
+          <p:cNvPr id="1026" name="Picture 2"/>
+          <p:cNvPicPr>
+            <a:picLocks noChangeAspect="1" noChangeArrowheads="1"/>
+          </p:cNvPicPr>
+          <p:nvPr/>
+        </p:nvPicPr>
+        <p:blipFill>
+          <a:blip r:embed="rId2">
+            <a:extLst>
+              <a:ext uri="{28A0092B-C50C-407E-A947-70E740481C1C}">
+                <a14:useLocalDpi xmlns:a14="http://schemas.microsoft.com/office/drawing/2010/main" val="0"/>
+              </a:ext>
+            </a:extLst>
+          </a:blip>
+          <a:srcRect/>
+          <a:stretch>
+            <a:fillRect/>
+          </a:stretch>
+        </p:blipFill>
+        <p:spPr bwMode="auto">
+          <a:xfrm>
+            <a:off x="2447319" y="1268759"/>
+            <a:ext cx="3945408" cy="5456103"/>
+          </a:xfrm>
+          <a:prstGeom prst="rect">
+            <a:avLst/>
+          </a:prstGeom>
+          <a:noFill/>
+          <a:ln>
+            <a:noFill/>
+          </a:ln>
+          <a:extLst>
+            <a:ext uri="{909E8E84-426E-40DD-AFC4-6F175D3DCCD1}">
+              <a14:hiddenFill xmlns:a14="http://schemas.microsoft.com/office/drawing/2010/main">
+                <a:solidFill>
+                  <a:schemeClr val="accent1"/>
+                </a:solidFill>
+              </a14:hiddenFill>
+            </a:ext>
+            <a:ext uri="{91240B29-F687-4F45-9708-019B960494DF}">
+              <a14:hiddenLine xmlns:a14="http://schemas.microsoft.com/office/drawing/2010/main" w="9525">
+                <a:solidFill>
+                  <a:schemeClr val="tx1"/>
+                </a:solidFill>
+                <a:miter lim="800000"/>
+                <a:headEnd/>
+                <a:tailEnd/>
+              </a14:hiddenLine>
+            </a:ext>
+          </a:extLst>
+        </p:spPr>
+      </p:pic>
+    </p:spTree>
+    <p:extLst>
+      <p:ext uri="{BB962C8B-B14F-4D97-AF65-F5344CB8AC3E}">
+        <p14:creationId xmlns:p14="http://schemas.microsoft.com/office/powerpoint/2010/main" val="1134163233"/>
+      </p:ext>
+    </p:extLst>
+  </p:cSld>
+  <p:clrMapOvr>
+    <a:masterClrMapping/>
+  </p:clrMapOvr>
+  <p:timing>
+    <p:tnLst>
+      <p:par>
+        <p:cTn id="1" dur="indefinite" restart="never" nodeType="tmRoot"/>
+      </p:par>
+    </p:tnLst>
+  </p:timing>
+</p:sld>
+</file>
+
+<file path=ppt/slides/slide6.xml><?xml version="1.0" encoding="utf-8"?>
+<p:sld xmlns:a="http://schemas.openxmlformats.org/drawingml/2006/main" xmlns:r="http://schemas.openxmlformats.org/officeDocument/2006/relationships" xmlns:p="http://schemas.openxmlformats.org/presentationml/2006/main">
+  <p:cSld>
+    <p:spTree>
+      <p:nvGrpSpPr>
+        <p:cNvPr id="1" name=""/>
+        <p:cNvGrpSpPr/>
+        <p:nvPr/>
+      </p:nvGrpSpPr>
+      <p:grpSpPr>
+        <a:xfrm>
+          <a:off x="0" y="0"/>
+          <a:ext cx="0" cy="0"/>
+          <a:chOff x="0" y="0"/>
+          <a:chExt cx="0" cy="0"/>
+        </a:xfrm>
+      </p:grpSpPr>
+      <p:sp>
+        <p:nvSpPr>
+          <p:cNvPr id="2" name="Title 1"/>
+          <p:cNvSpPr>
+            <a:spLocks noGrp="1"/>
+          </p:cNvSpPr>
+          <p:nvPr>
+            <p:ph type="title"/>
+          </p:nvPr>
+        </p:nvSpPr>
+        <p:spPr/>
+        <p:txBody>
+          <a:bodyPr>
+            <a:normAutofit fontScale="90000"/>
+          </a:bodyPr>
+          <a:lstStyle/>
+          <a:p>
+            <a:r>
+              <a:rPr lang="en-AU" dirty="0" smtClean="0"/>
+              <a:t>Current implementation – Translation</a:t>
+            </a:r>
+            <a:endParaRPr lang="en-AU" dirty="0"/>
+          </a:p>
+        </p:txBody>
+      </p:sp>
+      <p:sp>
+        <p:nvSpPr>
+          <p:cNvPr id="3" name="Content Placeholder 2"/>
+          <p:cNvSpPr>
+            <a:spLocks noGrp="1"/>
+          </p:cNvSpPr>
+          <p:nvPr>
+            <p:ph idx="1"/>
+          </p:nvPr>
+        </p:nvSpPr>
+        <p:spPr/>
+        <p:txBody>
+          <a:bodyPr/>
+          <a:lstStyle/>
+          <a:p>
+            <a:r>
+              <a:rPr lang="en-AU" dirty="0" smtClean="0"/>
+              <a:t>As specified by Jonathan</a:t>
+            </a:r>
+          </a:p>
+          <a:p>
+            <a:r>
+              <a:rPr lang="en-AU" dirty="0" smtClean="0"/>
+              <a:t>Define variables/reactions for stepwise (per amino acid) elongation of every polypeptide</a:t>
+            </a:r>
+          </a:p>
+          <a:p>
+            <a:pPr lvl="1"/>
+            <a:r>
+              <a:rPr lang="en-AU" dirty="0" smtClean="0"/>
+              <a:t>Created by </a:t>
+            </a:r>
+            <a:r>
+              <a:rPr lang="en-AU" dirty="0" err="1" smtClean="0"/>
+              <a:t>python.libSBML</a:t>
+            </a:r>
+            <a:r>
+              <a:rPr lang="en-AU" dirty="0" smtClean="0"/>
+              <a:t> script using protein sequences</a:t>
+            </a:r>
+          </a:p>
+        </p:txBody>
+      </p:sp>
+      <p:pic>
+        <p:nvPicPr>
+          <p:cNvPr id="1026" name="Picture 2"/>
+          <p:cNvPicPr>
+            <a:picLocks noChangeAspect="1" noChangeArrowheads="1"/>
+          </p:cNvPicPr>
+          <p:nvPr/>
+        </p:nvPicPr>
+        <p:blipFill>
+          <a:blip r:embed="rId2" cstate="print">
+            <a:extLst>
+              <a:ext uri="{28A0092B-C50C-407E-A947-70E740481C1C}">
+                <a14:useLocalDpi xmlns:a14="http://schemas.microsoft.com/office/drawing/2010/main" val="0"/>
+              </a:ext>
+            </a:extLst>
+          </a:blip>
+          <a:srcRect/>
+          <a:stretch>
+            <a:fillRect/>
+          </a:stretch>
+        </p:blipFill>
+        <p:spPr bwMode="auto">
+          <a:xfrm>
+            <a:off x="1475656" y="4196502"/>
+            <a:ext cx="6192688" cy="2306131"/>
+          </a:xfrm>
+          <a:prstGeom prst="rect">
+            <a:avLst/>
+          </a:prstGeom>
+          <a:noFill/>
+          <a:ln>
+            <a:noFill/>
+          </a:ln>
+          <a:effectLst/>
+          <a:extLst>
+            <a:ext uri="{909E8E84-426E-40DD-AFC4-6F175D3DCCD1}">
+              <a14:hiddenFill xmlns:a14="http://schemas.microsoft.com/office/drawing/2010/main">
+                <a:solidFill>
+                  <a:schemeClr val="accent1"/>
+                </a:solidFill>
+              </a14:hiddenFill>
+            </a:ext>
+            <a:ext uri="{91240B29-F687-4F45-9708-019B960494DF}">
+              <a14:hiddenLine xmlns:a14="http://schemas.microsoft.com/office/drawing/2010/main" w="9525">
+                <a:solidFill>
+                  <a:schemeClr val="tx1"/>
+                </a:solidFill>
+                <a:miter lim="800000"/>
+                <a:headEnd/>
+                <a:tailEnd/>
+              </a14:hiddenLine>
+            </a:ext>
+            <a:ext uri="{AF507438-7753-43E0-B8FC-AC1667EBCBE1}">
+              <a14:hiddenEffects xmlns:a14="http://schemas.microsoft.com/office/drawing/2010/main">
+                <a:effectLst>
+                  <a:outerShdw dist="35921" dir="2700000" algn="ctr" rotWithShape="0">
+                    <a:schemeClr val="bg2"/>
+                  </a:outerShdw>
+                </a:effectLst>
+              </a14:hiddenEffects>
+            </a:ext>
+          </a:extLst>
+        </p:spPr>
+      </p:pic>
+    </p:spTree>
+    <p:extLst>
+      <p:ext uri="{BB962C8B-B14F-4D97-AF65-F5344CB8AC3E}">
+        <p14:creationId xmlns:p14="http://schemas.microsoft.com/office/powerpoint/2010/main" val="3580135939"/>
+      </p:ext>
+    </p:extLst>
+  </p:cSld>
+  <p:clrMapOvr>
+    <a:masterClrMapping/>
+  </p:clrMapOvr>
+  <p:timing>
+    <p:tnLst>
+      <p:par>
+        <p:cTn id="1" dur="indefinite" restart="never" nodeType="tmRoot"/>
+      </p:par>
+    </p:tnLst>
+  </p:timing>
+</p:sld>
+</file>
+
+<file path=ppt/slides/slide7.xml><?xml version="1.0" encoding="utf-8"?>
+<p:sld xmlns:a="http://schemas.openxmlformats.org/drawingml/2006/main" xmlns:r="http://schemas.openxmlformats.org/officeDocument/2006/relationships" xmlns:p="http://schemas.openxmlformats.org/presentationml/2006/main">
+  <p:cSld>
+    <p:spTree>
+      <p:nvGrpSpPr>
+        <p:cNvPr id="1" name=""/>
+        <p:cNvGrpSpPr/>
+        <p:nvPr/>
+      </p:nvGrpSpPr>
+      <p:grpSpPr>
+        <a:xfrm>
+          <a:off x="0" y="0"/>
+          <a:ext cx="0" cy="0"/>
+          <a:chOff x="0" y="0"/>
+          <a:chExt cx="0" cy="0"/>
+        </a:xfrm>
+      </p:grpSpPr>
+      <p:sp>
+        <p:nvSpPr>
+          <p:cNvPr id="2" name="Title 1"/>
+          <p:cNvSpPr>
+            <a:spLocks noGrp="1"/>
+          </p:cNvSpPr>
+          <p:nvPr>
+            <p:ph type="title"/>
+          </p:nvPr>
+        </p:nvSpPr>
+        <p:spPr/>
+        <p:txBody>
+          <a:bodyPr>
+            <a:normAutofit fontScale="90000"/>
+          </a:bodyPr>
+          <a:lstStyle/>
+          <a:p>
+            <a:r>
+              <a:rPr lang="en-AU" dirty="0" smtClean="0"/>
+              <a:t>Current implementation – Translation</a:t>
+            </a:r>
+            <a:endParaRPr lang="en-AU" dirty="0"/>
+          </a:p>
+        </p:txBody>
+      </p:sp>
+      <p:sp>
+        <p:nvSpPr>
+          <p:cNvPr id="3" name="Content Placeholder 2"/>
+          <p:cNvSpPr>
+            <a:spLocks noGrp="1"/>
+          </p:cNvSpPr>
+          <p:nvPr>
+            <p:ph idx="1"/>
+          </p:nvPr>
+        </p:nvSpPr>
+        <p:spPr/>
+        <p:txBody>
+          <a:bodyPr/>
+          <a:lstStyle/>
+          <a:p>
+            <a:endParaRPr lang="en-AU" dirty="0" smtClean="0"/>
+          </a:p>
+        </p:txBody>
+      </p:sp>
+      <p:pic>
+        <p:nvPicPr>
+          <p:cNvPr id="2050" name="Picture 2" descr="C:\wc\2014_VW_modelling_workshop\wholecell-translation\sbgn\translation_withOmittedProcess_3.graphml.png"/>
+          <p:cNvPicPr>
+            <a:picLocks noChangeAspect="1" noChangeArrowheads="1"/>
+          </p:cNvPicPr>
+          <p:nvPr/>
+        </p:nvPicPr>
+        <p:blipFill>
+          <a:blip r:embed="rId2" cstate="print">
+            <a:extLst>
+              <a:ext uri="{28A0092B-C50C-407E-A947-70E740481C1C}">
+                <a14:useLocalDpi xmlns:a14="http://schemas.microsoft.com/office/drawing/2010/main" val="0"/>
+              </a:ext>
+            </a:extLst>
+          </a:blip>
+          <a:srcRect/>
+          <a:stretch>
+            <a:fillRect/>
+          </a:stretch>
+        </p:blipFill>
+        <p:spPr bwMode="auto">
+          <a:xfrm>
+            <a:off x="539552" y="1628800"/>
+            <a:ext cx="8119799" cy="3816424"/>
+          </a:xfrm>
+          <a:prstGeom prst="rect">
+            <a:avLst/>
+          </a:prstGeom>
+          <a:noFill/>
+          <a:extLst>
+            <a:ext uri="{909E8E84-426E-40DD-AFC4-6F175D3DCCD1}">
+              <a14:hiddenFill xmlns:a14="http://schemas.microsoft.com/office/drawing/2010/main">
+                <a:solidFill>
+                  <a:srgbClr val="FFFFFF"/>
+                </a:solidFill>
+              </a14:hiddenFill>
+            </a:ext>
+          </a:extLst>
+        </p:spPr>
+      </p:pic>
+    </p:spTree>
+    <p:extLst>
+      <p:ext uri="{BB962C8B-B14F-4D97-AF65-F5344CB8AC3E}">
+        <p14:creationId xmlns:p14="http://schemas.microsoft.com/office/powerpoint/2010/main" val="2597699786"/>
+      </p:ext>
+    </p:extLst>
+  </p:cSld>
+  <p:clrMapOvr>
+    <a:masterClrMapping/>
+  </p:clrMapOvr>
+  <p:timing>
+    <p:tnLst>
+      <p:par>
+        <p:cTn id="1" dur="indefinite" restart="never" nodeType="tmRoot"/>
+      </p:par>
+    </p:tnLst>
+  </p:timing>
+</p:sld>
+</file>
+
+<file path=ppt/slides/slide8.xml><?xml version="1.0" encoding="utf-8"?>
+<p:sld xmlns:a="http://schemas.openxmlformats.org/drawingml/2006/main" xmlns:r="http://schemas.openxmlformats.org/officeDocument/2006/relationships" xmlns:p="http://schemas.openxmlformats.org/presentationml/2006/main">
+  <p:cSld>
+    <p:spTree>
+      <p:nvGrpSpPr>
+        <p:cNvPr id="1" name=""/>
+        <p:cNvGrpSpPr/>
+        <p:nvPr/>
+      </p:nvGrpSpPr>
+      <p:grpSpPr>
+        <a:xfrm>
+          <a:off x="0" y="0"/>
+          <a:ext cx="0" cy="0"/>
+          <a:chOff x="0" y="0"/>
+          <a:chExt cx="0" cy="0"/>
+        </a:xfrm>
+      </p:grpSpPr>
+      <p:sp>
+        <p:nvSpPr>
+          <p:cNvPr id="2" name="Title 1"/>
+          <p:cNvSpPr>
+            <a:spLocks noGrp="1"/>
+          </p:cNvSpPr>
+          <p:nvPr>
+            <p:ph type="title"/>
+          </p:nvPr>
+        </p:nvSpPr>
+        <p:spPr/>
+        <p:txBody>
+          <a:bodyPr/>
+          <a:lstStyle/>
+          <a:p>
+            <a:r>
+              <a:rPr lang="en-AU" dirty="0" smtClean="0"/>
+              <a:t>Current Implementation</a:t>
+            </a:r>
+            <a:endParaRPr lang="en-AU" dirty="0"/>
+          </a:p>
+        </p:txBody>
+      </p:sp>
+      <p:sp>
+        <p:nvSpPr>
+          <p:cNvPr id="3" name="Content Placeholder 2"/>
+          <p:cNvSpPr>
+            <a:spLocks noGrp="1"/>
+          </p:cNvSpPr>
+          <p:nvPr>
+            <p:ph idx="1"/>
+          </p:nvPr>
+        </p:nvSpPr>
+        <p:spPr>
+          <a:xfrm>
+            <a:off x="457200" y="1600200"/>
+            <a:ext cx="8229600" cy="4853136"/>
+          </a:xfrm>
+        </p:spPr>
+        <p:txBody>
+          <a:bodyPr>
+            <a:normAutofit lnSpcReduction="10000"/>
+          </a:bodyPr>
+          <a:lstStyle/>
+          <a:p>
+            <a:r>
+              <a:rPr lang="en-AU" dirty="0" smtClean="0"/>
+              <a:t>Avoid stochastic process by applying Gillespie algorithm</a:t>
+            </a:r>
+          </a:p>
+          <a:p>
+            <a:pPr lvl="1"/>
+            <a:r>
+              <a:rPr lang="en-AU" dirty="0" smtClean="0"/>
+              <a:t>Handles relative likelihoods of alternative reactions, weighted by concentrations</a:t>
+            </a:r>
+          </a:p>
+          <a:p>
+            <a:pPr lvl="1"/>
+            <a:r>
+              <a:rPr lang="en-AU" dirty="0" smtClean="0"/>
+              <a:t>More natural SBML representation, but very large SBML files (long time to parse; much greater memory requirements; greatly reduced run times in the absence of ‘sparse matrix’ representation)</a:t>
+            </a:r>
+          </a:p>
+          <a:p>
+            <a:r>
+              <a:rPr lang="en-AU" dirty="0" smtClean="0"/>
+              <a:t>Need to run smaller translation model (e.g. 30 proteins, reduced length) to test it</a:t>
+            </a:r>
+            <a:endParaRPr lang="en-AU" dirty="0"/>
+          </a:p>
+        </p:txBody>
+      </p:sp>
+    </p:spTree>
+    <p:extLst>
+      <p:ext uri="{BB962C8B-B14F-4D97-AF65-F5344CB8AC3E}">
+        <p14:creationId xmlns:p14="http://schemas.microsoft.com/office/powerpoint/2010/main" val="2148760098"/>
+      </p:ext>
+    </p:extLst>
+  </p:cSld>
+  <p:clrMapOvr>
+    <a:masterClrMapping/>
+  </p:clrMapOvr>
+  <p:timing>
+    <p:tnLst>
+      <p:par>
+        <p:cTn id="1" dur="indefinite" restart="never" nodeType="tmRoot"/>
+      </p:par>
+    </p:tnLst>
+  </p:timing>
 </p:sld>
 </file>
 
@@ -4768,12 +4901,18 @@
         </p:nvSpPr>
         <p:spPr/>
         <p:txBody>
-          <a:bodyPr/>
-          <a:lstStyle/>
-          <a:p>
-            <a:r>
-              <a:rPr lang="en-AU" dirty="0" smtClean="0"/>
-              <a:t>Things to fix/change - Translation</a:t>
+          <a:bodyPr>
+            <a:normAutofit fontScale="90000"/>
+          </a:bodyPr>
+          <a:lstStyle/>
+          <a:p>
+            <a:r>
+              <a:rPr lang="en-AU" dirty="0" smtClean="0"/>
+              <a:t>Things to fix/change - </a:t>
+            </a:r>
+            <a:r>
+              <a:rPr lang="en-AU" dirty="0" err="1" smtClean="0"/>
+              <a:t>AminoAcylation</a:t>
             </a:r>
             <a:endParaRPr lang="en-AU" dirty="0"/>
           </a:p>
@@ -4789,85 +4928,253 @@
             <p:ph idx="1"/>
           </p:nvPr>
         </p:nvSpPr>
-        <p:spPr>
-          <a:xfrm>
-            <a:off x="457200" y="1600200"/>
-            <a:ext cx="8229600" cy="4925144"/>
-          </a:xfrm>
-        </p:spPr>
+        <p:spPr/>
         <p:txBody>
           <a:bodyPr>
-            <a:normAutofit fontScale="92500" lnSpcReduction="10000"/>
+            <a:normAutofit/>
           </a:bodyPr>
           <a:lstStyle/>
           <a:p>
             <a:r>
-              <a:rPr lang="en-AU" dirty="0" smtClean="0"/>
-              <a:t>Antibiotic effects: drive ribosome disassembly/block </a:t>
-            </a:r>
-            <a:r>
               <a:rPr lang="en-AU" dirty="0" err="1" smtClean="0"/>
-              <a:t>ribsome</a:t>
-            </a:r>
-            <a:r>
-              <a:rPr lang="en-AU" dirty="0" smtClean="0"/>
-              <a:t> assembly?</a:t>
+              <a:t>tRNA</a:t>
+            </a:r>
+            <a:r>
+              <a:rPr lang="en-AU" dirty="0" smtClean="0"/>
+              <a:t> </a:t>
+            </a:r>
+            <a:r>
+              <a:rPr lang="en-AU" dirty="0" err="1" smtClean="0"/>
+              <a:t>aminoacylation</a:t>
+            </a:r>
+            <a:r>
+              <a:rPr lang="en-AU" dirty="0" smtClean="0"/>
+              <a:t> performed as a single step catalysed by </a:t>
+            </a:r>
+            <a:r>
+              <a:rPr lang="en-AU" dirty="0" err="1" smtClean="0"/>
+              <a:t>AAx-tRNA</a:t>
+            </a:r>
+            <a:r>
+              <a:rPr lang="en-AU" dirty="0" smtClean="0"/>
+              <a:t> ligase</a:t>
             </a:r>
           </a:p>
           <a:p>
             <a:pPr lvl="1"/>
             <a:r>
               <a:rPr lang="en-AU" dirty="0" smtClean="0"/>
-              <a:t>Currently in protein activation submodule</a:t>
-            </a:r>
-          </a:p>
-          <a:p>
+              <a:t>Introduce intermediate steps</a:t>
+            </a:r>
+          </a:p>
+          <a:p>
+            <a:pPr marL="57150" indent="0">
+              <a:buNone/>
+            </a:pPr>
             <a:endParaRPr lang="en-AU" dirty="0"/>
           </a:p>
           <a:p>
-            <a:r>
-              <a:rPr lang="en-AU" dirty="0" smtClean="0"/>
-              <a:t>Translation reactions should be built from mRNA sequence (rather than protein sequence) to allow for mutations</a:t>
-            </a:r>
-          </a:p>
-          <a:p>
-            <a:endParaRPr lang="en-AU" dirty="0"/>
-          </a:p>
-          <a:p>
-            <a:r>
-              <a:rPr lang="en-AU" dirty="0" smtClean="0"/>
-              <a:t>EF-P: catalyses attachment of </a:t>
-            </a:r>
-            <a:r>
-              <a:rPr lang="en-AU" dirty="0" err="1" smtClean="0"/>
-              <a:t>fMET</a:t>
-            </a:r>
-            <a:r>
-              <a:rPr lang="en-AU" dirty="0" smtClean="0"/>
-              <a:t> to 2</a:t>
-            </a:r>
-            <a:r>
-              <a:rPr lang="en-AU" baseline="30000" dirty="0" smtClean="0"/>
-              <a:t>nd</a:t>
-            </a:r>
-            <a:r>
-              <a:rPr lang="en-AU" dirty="0" smtClean="0"/>
-              <a:t> amino acid</a:t>
-            </a:r>
-            <a:endParaRPr lang="en-AU" dirty="0"/>
+            <a:pPr marL="57150" indent="0">
+              <a:buNone/>
+            </a:pPr>
+            <a:r>
+              <a:rPr lang="en-AU" sz="2800" dirty="0" err="1" smtClean="0"/>
+              <a:t>AAx</a:t>
+            </a:r>
+            <a:r>
+              <a:rPr lang="en-AU" sz="2800" dirty="0" smtClean="0"/>
+              <a:t> + </a:t>
+            </a:r>
+            <a:r>
+              <a:rPr lang="en-AU" sz="2800" dirty="0" err="1" smtClean="0"/>
+              <a:t>tRNA</a:t>
+            </a:r>
+            <a:r>
+              <a:rPr lang="en-AU" sz="2800" dirty="0" smtClean="0"/>
+              <a:t>(</a:t>
+            </a:r>
+            <a:r>
+              <a:rPr lang="en-AU" sz="2800" dirty="0" err="1" smtClean="0"/>
+              <a:t>AAx</a:t>
+            </a:r>
+            <a:r>
+              <a:rPr lang="en-AU" sz="2800" dirty="0" smtClean="0"/>
+              <a:t>) + ATP </a:t>
+            </a:r>
+            <a:r>
+              <a:rPr lang="en-AU" sz="2800" dirty="0" smtClean="0">
+                <a:sym typeface="Wingdings" panose="05000000000000000000" pitchFamily="2" charset="2"/>
+              </a:rPr>
+              <a:t> </a:t>
+            </a:r>
+            <a:r>
+              <a:rPr lang="en-AU" sz="2800" dirty="0" err="1" smtClean="0">
+                <a:sym typeface="Wingdings" panose="05000000000000000000" pitchFamily="2" charset="2"/>
+              </a:rPr>
+              <a:t>AAx-tRNA</a:t>
+            </a:r>
+            <a:r>
+              <a:rPr lang="en-AU" sz="2800" dirty="0" smtClean="0">
+                <a:sym typeface="Wingdings" panose="05000000000000000000" pitchFamily="2" charset="2"/>
+              </a:rPr>
+              <a:t>(</a:t>
+            </a:r>
+            <a:r>
+              <a:rPr lang="en-AU" sz="2800" dirty="0" err="1" smtClean="0">
+                <a:sym typeface="Wingdings" panose="05000000000000000000" pitchFamily="2" charset="2"/>
+              </a:rPr>
+              <a:t>AAx</a:t>
+            </a:r>
+            <a:r>
+              <a:rPr lang="en-AU" sz="2800" dirty="0" smtClean="0">
+                <a:sym typeface="Wingdings" panose="05000000000000000000" pitchFamily="2" charset="2"/>
+              </a:rPr>
+              <a:t>) + </a:t>
+            </a:r>
+            <a:r>
+              <a:rPr lang="en-AU" sz="2800" dirty="0" err="1" smtClean="0">
+                <a:sym typeface="Wingdings" panose="05000000000000000000" pitchFamily="2" charset="2"/>
+              </a:rPr>
+              <a:t>PPi</a:t>
+            </a:r>
+            <a:r>
+              <a:rPr lang="en-AU" sz="2800" dirty="0" smtClean="0">
+                <a:sym typeface="Wingdings" panose="05000000000000000000" pitchFamily="2" charset="2"/>
+              </a:rPr>
+              <a:t>  + AMP</a:t>
+            </a:r>
+          </a:p>
+          <a:p>
+            <a:pPr marL="57150" indent="0">
+              <a:buNone/>
+            </a:pPr>
+            <a:endParaRPr lang="en-AU" sz="2800" dirty="0">
+              <a:sym typeface="Wingdings" panose="05000000000000000000" pitchFamily="2" charset="2"/>
+            </a:endParaRPr>
+          </a:p>
+          <a:p>
+            <a:pPr marL="57150" indent="0">
+              <a:buNone/>
+            </a:pPr>
+            <a:r>
+              <a:rPr lang="en-AU" sz="2800" dirty="0" err="1" smtClean="0">
+                <a:sym typeface="Wingdings" panose="05000000000000000000" pitchFamily="2" charset="2"/>
+              </a:rPr>
+              <a:t>AAx</a:t>
+            </a:r>
+            <a:r>
+              <a:rPr lang="en-AU" sz="2800" dirty="0" smtClean="0">
+                <a:sym typeface="Wingdings" panose="05000000000000000000" pitchFamily="2" charset="2"/>
+              </a:rPr>
+              <a:t> + ATP  </a:t>
+            </a:r>
+            <a:r>
+              <a:rPr lang="en-AU" sz="2800" dirty="0" err="1" smtClean="0">
+                <a:sym typeface="Wingdings" panose="05000000000000000000" pitchFamily="2" charset="2"/>
+              </a:rPr>
+              <a:t>AAx</a:t>
+            </a:r>
+            <a:r>
+              <a:rPr lang="en-AU" sz="2800" dirty="0" smtClean="0">
+                <a:sym typeface="Wingdings" panose="05000000000000000000" pitchFamily="2" charset="2"/>
+              </a:rPr>
+              <a:t>-AMP + </a:t>
+            </a:r>
+            <a:r>
+              <a:rPr lang="en-AU" sz="2800" dirty="0" err="1" smtClean="0">
+                <a:sym typeface="Wingdings" panose="05000000000000000000" pitchFamily="2" charset="2"/>
+              </a:rPr>
+              <a:t>PPi</a:t>
+            </a:r>
+            <a:endParaRPr lang="en-AU" sz="2800" dirty="0" smtClean="0">
+              <a:sym typeface="Wingdings" panose="05000000000000000000" pitchFamily="2" charset="2"/>
+            </a:endParaRPr>
+          </a:p>
+          <a:p>
+            <a:pPr marL="57150" indent="0">
+              <a:buNone/>
+            </a:pPr>
+            <a:r>
+              <a:rPr lang="en-AU" sz="2800" dirty="0" err="1" smtClean="0">
+                <a:sym typeface="Wingdings" panose="05000000000000000000" pitchFamily="2" charset="2"/>
+              </a:rPr>
+              <a:t>AAx</a:t>
+            </a:r>
+            <a:r>
+              <a:rPr lang="en-AU" sz="2800" dirty="0" smtClean="0">
+                <a:sym typeface="Wingdings" panose="05000000000000000000" pitchFamily="2" charset="2"/>
+              </a:rPr>
+              <a:t>-AMP + </a:t>
+            </a:r>
+            <a:r>
+              <a:rPr lang="en-AU" sz="2800" dirty="0" err="1" smtClean="0">
+                <a:sym typeface="Wingdings" panose="05000000000000000000" pitchFamily="2" charset="2"/>
+              </a:rPr>
+              <a:t>tRNA</a:t>
+            </a:r>
+            <a:r>
+              <a:rPr lang="en-AU" sz="2800" dirty="0" smtClean="0">
+                <a:sym typeface="Wingdings" panose="05000000000000000000" pitchFamily="2" charset="2"/>
+              </a:rPr>
+              <a:t>(</a:t>
+            </a:r>
+            <a:r>
+              <a:rPr lang="en-AU" sz="2800" dirty="0" err="1" smtClean="0">
+                <a:sym typeface="Wingdings" panose="05000000000000000000" pitchFamily="2" charset="2"/>
+              </a:rPr>
+              <a:t>AAx</a:t>
+            </a:r>
+            <a:r>
+              <a:rPr lang="en-AU" sz="2800" dirty="0" smtClean="0">
+                <a:sym typeface="Wingdings" panose="05000000000000000000" pitchFamily="2" charset="2"/>
+              </a:rPr>
+              <a:t>)  AMP + </a:t>
+            </a:r>
+            <a:r>
+              <a:rPr lang="en-AU" sz="2800" dirty="0" err="1" smtClean="0">
+                <a:sym typeface="Wingdings" panose="05000000000000000000" pitchFamily="2" charset="2"/>
+              </a:rPr>
+              <a:t>AAx-tRNA</a:t>
+            </a:r>
+            <a:r>
+              <a:rPr lang="en-AU" sz="2800" dirty="0" smtClean="0">
+                <a:sym typeface="Wingdings" panose="05000000000000000000" pitchFamily="2" charset="2"/>
+              </a:rPr>
+              <a:t>(</a:t>
+            </a:r>
+            <a:r>
+              <a:rPr lang="en-AU" sz="2800" dirty="0" err="1" smtClean="0">
+                <a:sym typeface="Wingdings" panose="05000000000000000000" pitchFamily="2" charset="2"/>
+              </a:rPr>
+              <a:t>AAx</a:t>
+            </a:r>
+            <a:r>
+              <a:rPr lang="en-AU" sz="2800" dirty="0" smtClean="0">
+                <a:sym typeface="Wingdings" panose="05000000000000000000" pitchFamily="2" charset="2"/>
+              </a:rPr>
+              <a:t>)</a:t>
+            </a:r>
+            <a:endParaRPr lang="en-AU" sz="2800" dirty="0"/>
           </a:p>
         </p:txBody>
       </p:sp>
     </p:spTree>
     <p:extLst>
       <p:ext uri="{BB962C8B-B14F-4D97-AF65-F5344CB8AC3E}">
-        <p14:creationId xmlns:p14="http://schemas.microsoft.com/office/powerpoint/2010/main" val="3498815092"/>
+        <p14:creationId xmlns:p14="http://schemas.microsoft.com/office/powerpoint/2010/main" val="368424594"/>
       </p:ext>
     </p:extLst>
   </p:cSld>
   <p:clrMapOvr>
     <a:masterClrMapping/>
   </p:clrMapOvr>
+  <p:timing>
+    <p:tnLst>
+      <p:par>
+        <p:cTn id="1" dur="indefinite" restart="never" nodeType="tmRoot"/>
+      </p:par>
+    </p:tnLst>
+  </p:timing>
 </p:sld>
 </file>
 

</xml_diff>

<commit_message>
Further updates of README
Completed README file to accompany our modules. Fixed a typo in the
presentation regarding model runtimes.
</commit_message>
<xml_diff>
--- a/translation_finalPres.pptx
+++ b/translation_finalPres.pptx
@@ -300,7 +300,7 @@
           <a:p>
             <a:fld id="{89D0E583-D33E-46A0-B091-24B7D881B65F}" type="datetimeFigureOut">
               <a:rPr lang="en-AU" smtClean="0"/>
-              <a:t>13/03/2015</a:t>
+              <a:t>14/03/2015</a:t>
             </a:fld>
             <a:endParaRPr lang="en-AU"/>
           </a:p>
@@ -470,7 +470,7 @@
           <a:p>
             <a:fld id="{89D0E583-D33E-46A0-B091-24B7D881B65F}" type="datetimeFigureOut">
               <a:rPr lang="en-AU" smtClean="0"/>
-              <a:t>13/03/2015</a:t>
+              <a:t>14/03/2015</a:t>
             </a:fld>
             <a:endParaRPr lang="en-AU"/>
           </a:p>
@@ -650,7 +650,7 @@
           <a:p>
             <a:fld id="{89D0E583-D33E-46A0-B091-24B7D881B65F}" type="datetimeFigureOut">
               <a:rPr lang="en-AU" smtClean="0"/>
-              <a:t>13/03/2015</a:t>
+              <a:t>14/03/2015</a:t>
             </a:fld>
             <a:endParaRPr lang="en-AU"/>
           </a:p>
@@ -820,7 +820,7 @@
           <a:p>
             <a:fld id="{89D0E583-D33E-46A0-B091-24B7D881B65F}" type="datetimeFigureOut">
               <a:rPr lang="en-AU" smtClean="0"/>
-              <a:t>13/03/2015</a:t>
+              <a:t>14/03/2015</a:t>
             </a:fld>
             <a:endParaRPr lang="en-AU"/>
           </a:p>
@@ -1066,7 +1066,7 @@
           <a:p>
             <a:fld id="{89D0E583-D33E-46A0-B091-24B7D881B65F}" type="datetimeFigureOut">
               <a:rPr lang="en-AU" smtClean="0"/>
-              <a:t>13/03/2015</a:t>
+              <a:t>14/03/2015</a:t>
             </a:fld>
             <a:endParaRPr lang="en-AU"/>
           </a:p>
@@ -1354,7 +1354,7 @@
           <a:p>
             <a:fld id="{89D0E583-D33E-46A0-B091-24B7D881B65F}" type="datetimeFigureOut">
               <a:rPr lang="en-AU" smtClean="0"/>
-              <a:t>13/03/2015</a:t>
+              <a:t>14/03/2015</a:t>
             </a:fld>
             <a:endParaRPr lang="en-AU"/>
           </a:p>
@@ -1776,7 +1776,7 @@
           <a:p>
             <a:fld id="{89D0E583-D33E-46A0-B091-24B7D881B65F}" type="datetimeFigureOut">
               <a:rPr lang="en-AU" smtClean="0"/>
-              <a:t>13/03/2015</a:t>
+              <a:t>14/03/2015</a:t>
             </a:fld>
             <a:endParaRPr lang="en-AU"/>
           </a:p>
@@ -1894,7 +1894,7 @@
           <a:p>
             <a:fld id="{89D0E583-D33E-46A0-B091-24B7D881B65F}" type="datetimeFigureOut">
               <a:rPr lang="en-AU" smtClean="0"/>
-              <a:t>13/03/2015</a:t>
+              <a:t>14/03/2015</a:t>
             </a:fld>
             <a:endParaRPr lang="en-AU"/>
           </a:p>
@@ -1989,7 +1989,7 @@
           <a:p>
             <a:fld id="{89D0E583-D33E-46A0-B091-24B7D881B65F}" type="datetimeFigureOut">
               <a:rPr lang="en-AU" smtClean="0"/>
-              <a:t>13/03/2015</a:t>
+              <a:t>14/03/2015</a:t>
             </a:fld>
             <a:endParaRPr lang="en-AU"/>
           </a:p>
@@ -2266,7 +2266,7 @@
           <a:p>
             <a:fld id="{89D0E583-D33E-46A0-B091-24B7D881B65F}" type="datetimeFigureOut">
               <a:rPr lang="en-AU" smtClean="0"/>
-              <a:t>13/03/2015</a:t>
+              <a:t>14/03/2015</a:t>
             </a:fld>
             <a:endParaRPr lang="en-AU"/>
           </a:p>
@@ -2519,7 +2519,7 @@
           <a:p>
             <a:fld id="{89D0E583-D33E-46A0-B091-24B7D881B65F}" type="datetimeFigureOut">
               <a:rPr lang="en-AU" smtClean="0"/>
-              <a:t>13/03/2015</a:t>
+              <a:t>14/03/2015</a:t>
             </a:fld>
             <a:endParaRPr lang="en-AU"/>
           </a:p>
@@ -2732,7 +2732,7 @@
           <a:p>
             <a:fld id="{89D0E583-D33E-46A0-B091-24B7D881B65F}" type="datetimeFigureOut">
               <a:rPr lang="en-AU" smtClean="0"/>
-              <a:t>13/03/2015</a:t>
+              <a:t>14/03/2015</a:t>
             </a:fld>
             <a:endParaRPr lang="en-AU"/>
           </a:p>
@@ -4840,7 +4840,19 @@
             <a:pPr lvl="1"/>
             <a:r>
               <a:rPr lang="en-AU" dirty="0" smtClean="0"/>
-              <a:t>More natural SBML representation, but very large SBML files (long time to parse; much greater memory requirements; greatly reduced run times in the absence of ‘sparse matrix’ representation)</a:t>
+              <a:t>More natural SBML representation, but very large SBML files (long time to parse; much greater memory requirements; </a:t>
+            </a:r>
+            <a:r>
+              <a:rPr lang="en-AU" smtClean="0"/>
+              <a:t>greatly </a:t>
+            </a:r>
+            <a:r>
+              <a:rPr lang="en-AU" smtClean="0"/>
+              <a:t>increased run </a:t>
+            </a:r>
+            <a:r>
+              <a:rPr lang="en-AU" dirty="0" smtClean="0"/>
+              <a:t>times in the absence of ‘sparse matrix’ representation)</a:t>
             </a:r>
           </a:p>
           <a:p>

</xml_diff>